<commit_message>
Improve diagrams for Mx4PC Operator
</commit_message>
<xml_diff>
--- a/content/developerportal/deploy/attachments/private-cloud-tech-appendix/mx4pc-diagrams.pptx
+++ b/content/developerportal/deploy/attachments/private-cloud-tech-appendix/mx4pc-diagrams.pptx
@@ -11,11 +11,12 @@
     <p:sldId id="262" r:id="rId5"/>
     <p:sldId id="263" r:id="rId6"/>
     <p:sldId id="264" r:id="rId7"/>
-    <p:sldId id="265" r:id="rId8"/>
-    <p:sldId id="266" r:id="rId9"/>
+    <p:sldId id="269" r:id="rId8"/>
+    <p:sldId id="270" r:id="rId9"/>
     <p:sldId id="267" r:id="rId10"/>
     <p:sldId id="268" r:id="rId11"/>
-    <p:sldId id="269" r:id="rId12"/>
+    <p:sldId id="265" r:id="rId12"/>
+    <p:sldId id="266" r:id="rId13"/>
   </p:sldIdLst>
   <p:sldSz cx="12192000" cy="6858000"/>
   <p:notesSz cx="6858000" cy="9144000"/>
@@ -325,7 +326,7 @@
           <a:p>
             <a:fld id="{9D388CDE-E55B-4E44-98A6-02EE790F9E9B}" type="datetimeFigureOut">
               <a:rPr lang="en-US" smtClean="0"/>
-              <a:t>12/28/2021</a:t>
+              <a:t>1/3/2022</a:t>
             </a:fld>
             <a:endParaRPr lang="en-US"/>
           </a:p>
@@ -523,7 +524,7 @@
           <a:p>
             <a:fld id="{9D388CDE-E55B-4E44-98A6-02EE790F9E9B}" type="datetimeFigureOut">
               <a:rPr lang="en-US" smtClean="0"/>
-              <a:t>12/28/2021</a:t>
+              <a:t>1/3/2022</a:t>
             </a:fld>
             <a:endParaRPr lang="en-US"/>
           </a:p>
@@ -731,7 +732,7 @@
           <a:p>
             <a:fld id="{9D388CDE-E55B-4E44-98A6-02EE790F9E9B}" type="datetimeFigureOut">
               <a:rPr lang="en-US" smtClean="0"/>
-              <a:t>12/28/2021</a:t>
+              <a:t>1/3/2022</a:t>
             </a:fld>
             <a:endParaRPr lang="en-US"/>
           </a:p>
@@ -929,7 +930,7 @@
           <a:p>
             <a:fld id="{9D388CDE-E55B-4E44-98A6-02EE790F9E9B}" type="datetimeFigureOut">
               <a:rPr lang="en-US" smtClean="0"/>
-              <a:t>12/28/2021</a:t>
+              <a:t>1/3/2022</a:t>
             </a:fld>
             <a:endParaRPr lang="en-US"/>
           </a:p>
@@ -1204,7 +1205,7 @@
           <a:p>
             <a:fld id="{9D388CDE-E55B-4E44-98A6-02EE790F9E9B}" type="datetimeFigureOut">
               <a:rPr lang="en-US" smtClean="0"/>
-              <a:t>12/28/2021</a:t>
+              <a:t>1/3/2022</a:t>
             </a:fld>
             <a:endParaRPr lang="en-US"/>
           </a:p>
@@ -1469,7 +1470,7 @@
           <a:p>
             <a:fld id="{9D388CDE-E55B-4E44-98A6-02EE790F9E9B}" type="datetimeFigureOut">
               <a:rPr lang="en-US" smtClean="0"/>
-              <a:t>12/28/2021</a:t>
+              <a:t>1/3/2022</a:t>
             </a:fld>
             <a:endParaRPr lang="en-US"/>
           </a:p>
@@ -1881,7 +1882,7 @@
           <a:p>
             <a:fld id="{9D388CDE-E55B-4E44-98A6-02EE790F9E9B}" type="datetimeFigureOut">
               <a:rPr lang="en-US" smtClean="0"/>
-              <a:t>12/28/2021</a:t>
+              <a:t>1/3/2022</a:t>
             </a:fld>
             <a:endParaRPr lang="en-US"/>
           </a:p>
@@ -2022,7 +2023,7 @@
           <a:p>
             <a:fld id="{9D388CDE-E55B-4E44-98A6-02EE790F9E9B}" type="datetimeFigureOut">
               <a:rPr lang="en-US" smtClean="0"/>
-              <a:t>12/28/2021</a:t>
+              <a:t>1/3/2022</a:t>
             </a:fld>
             <a:endParaRPr lang="en-US"/>
           </a:p>
@@ -2135,7 +2136,7 @@
           <a:p>
             <a:fld id="{9D388CDE-E55B-4E44-98A6-02EE790F9E9B}" type="datetimeFigureOut">
               <a:rPr lang="en-US" smtClean="0"/>
-              <a:t>12/28/2021</a:t>
+              <a:t>1/3/2022</a:t>
             </a:fld>
             <a:endParaRPr lang="en-US"/>
           </a:p>
@@ -2446,7 +2447,7 @@
           <a:p>
             <a:fld id="{9D388CDE-E55B-4E44-98A6-02EE790F9E9B}" type="datetimeFigureOut">
               <a:rPr lang="en-US" smtClean="0"/>
-              <a:t>12/28/2021</a:t>
+              <a:t>1/3/2022</a:t>
             </a:fld>
             <a:endParaRPr lang="en-US"/>
           </a:p>
@@ -2734,7 +2735,7 @@
           <a:p>
             <a:fld id="{9D388CDE-E55B-4E44-98A6-02EE790F9E9B}" type="datetimeFigureOut">
               <a:rPr lang="en-US" smtClean="0"/>
-              <a:t>12/28/2021</a:t>
+              <a:t>1/3/2022</a:t>
             </a:fld>
             <a:endParaRPr lang="en-US"/>
           </a:p>
@@ -2975,7 +2976,7 @@
           <a:p>
             <a:fld id="{9D388CDE-E55B-4E44-98A6-02EE790F9E9B}" type="datetimeFigureOut">
               <a:rPr lang="en-US" smtClean="0"/>
-              <a:t>12/28/2021</a:t>
+              <a:t>1/3/2022</a:t>
             </a:fld>
             <a:endParaRPr lang="en-US"/>
           </a:p>
@@ -3408,7 +3409,7 @@
         </p:nvCxnSpPr>
         <p:spPr>
           <a:xfrm>
-            <a:off x="4295775" y="1557335"/>
+            <a:off x="4080622" y="1859894"/>
             <a:ext cx="0" cy="4925443"/>
           </a:xfrm>
           <a:prstGeom prst="line">
@@ -3455,7 +3456,7 @@
         </p:nvCxnSpPr>
         <p:spPr>
           <a:xfrm>
-            <a:off x="3108325" y="1557338"/>
+            <a:off x="2893172" y="1859897"/>
             <a:ext cx="0" cy="4925443"/>
           </a:xfrm>
           <a:prstGeom prst="line">
@@ -3502,7 +3503,7 @@
         </p:nvCxnSpPr>
         <p:spPr>
           <a:xfrm>
-            <a:off x="1882775" y="1557338"/>
+            <a:off x="1667622" y="1859897"/>
             <a:ext cx="0" cy="4925443"/>
           </a:xfrm>
           <a:prstGeom prst="line">
@@ -3549,7 +3550,7 @@
         </p:nvCxnSpPr>
         <p:spPr>
           <a:xfrm>
-            <a:off x="5519738" y="1557338"/>
+            <a:off x="5304585" y="1859897"/>
             <a:ext cx="0" cy="4925443"/>
           </a:xfrm>
           <a:prstGeom prst="line">
@@ -3596,7 +3597,7 @@
         </p:nvCxnSpPr>
         <p:spPr>
           <a:xfrm>
-            <a:off x="695325" y="1557338"/>
+            <a:off x="480172" y="1859897"/>
             <a:ext cx="0" cy="4925443"/>
           </a:xfrm>
           <a:prstGeom prst="line">
@@ -3641,7 +3642,7 @@
         </p:nvSpPr>
         <p:spPr>
           <a:xfrm>
-            <a:off x="692928" y="6138028"/>
+            <a:off x="477775" y="6440587"/>
             <a:ext cx="1180771" cy="200055"/>
           </a:xfrm>
           <a:prstGeom prst="rect">
@@ -3677,7 +3678,7 @@
         </p:nvSpPr>
         <p:spPr>
           <a:xfrm>
-            <a:off x="4241256" y="2851578"/>
+            <a:off x="4026103" y="3154137"/>
             <a:ext cx="1180771" cy="200055"/>
           </a:xfrm>
           <a:prstGeom prst="rect">
@@ -3713,7 +3714,7 @@
         </p:nvSpPr>
         <p:spPr>
           <a:xfrm>
-            <a:off x="3117825" y="4807194"/>
+            <a:off x="2902672" y="5109753"/>
             <a:ext cx="1180771" cy="200055"/>
           </a:xfrm>
           <a:prstGeom prst="rect">
@@ -3753,7 +3754,7 @@
         </p:nvSpPr>
         <p:spPr>
           <a:xfrm>
-            <a:off x="4307785" y="4318391"/>
+            <a:off x="4092632" y="4620950"/>
             <a:ext cx="1216716" cy="307777"/>
           </a:xfrm>
           <a:prstGeom prst="rect">
@@ -3797,7 +3798,7 @@
         </p:nvSpPr>
         <p:spPr>
           <a:xfrm>
-            <a:off x="1828799" y="1847719"/>
+            <a:off x="1613646" y="2150278"/>
             <a:ext cx="94593" cy="479271"/>
           </a:xfrm>
           <a:prstGeom prst="rect">
@@ -3851,7 +3852,7 @@
         </p:nvSpPr>
         <p:spPr>
           <a:xfrm>
-            <a:off x="3056724" y="2461950"/>
+            <a:off x="2841571" y="2764509"/>
             <a:ext cx="82599" cy="974860"/>
           </a:xfrm>
           <a:prstGeom prst="rect">
@@ -3905,7 +3906,7 @@
         </p:nvSpPr>
         <p:spPr>
           <a:xfrm>
-            <a:off x="4250530" y="2613383"/>
+            <a:off x="4035377" y="2915942"/>
             <a:ext cx="83342" cy="716874"/>
           </a:xfrm>
           <a:prstGeom prst="rect">
@@ -3959,7 +3960,7 @@
         </p:nvSpPr>
         <p:spPr>
           <a:xfrm>
-            <a:off x="695776" y="2341763"/>
+            <a:off x="480623" y="2644322"/>
             <a:ext cx="2399462" cy="200055"/>
           </a:xfrm>
           <a:prstGeom prst="rect">
@@ -3995,7 +3996,7 @@
         </p:nvSpPr>
         <p:spPr>
           <a:xfrm>
-            <a:off x="3113787" y="2497931"/>
+            <a:off x="2898634" y="2800490"/>
             <a:ext cx="1202578" cy="200055"/>
           </a:xfrm>
           <a:prstGeom prst="rect">
@@ -4036,7 +4037,7 @@
         </p:nvSpPr>
         <p:spPr>
           <a:xfrm>
-            <a:off x="702006" y="1771848"/>
+            <a:off x="486853" y="2074407"/>
             <a:ext cx="1194128" cy="200055"/>
           </a:xfrm>
           <a:prstGeom prst="rect">
@@ -4072,7 +4073,7 @@
         </p:nvSpPr>
         <p:spPr>
           <a:xfrm>
-            <a:off x="1400350" y="908097"/>
+            <a:off x="1185197" y="1210656"/>
             <a:ext cx="964850" cy="649241"/>
           </a:xfrm>
           <a:prstGeom prst="rect">
@@ -4121,7 +4122,7 @@
         </p:nvSpPr>
         <p:spPr>
           <a:xfrm>
-            <a:off x="2657946" y="908094"/>
+            <a:off x="2442793" y="1210653"/>
             <a:ext cx="964850" cy="649241"/>
           </a:xfrm>
           <a:prstGeom prst="rect">
@@ -4174,7 +4175,7 @@
         </p:nvSpPr>
         <p:spPr>
           <a:xfrm>
-            <a:off x="3813350" y="908094"/>
+            <a:off x="3598197" y="1210653"/>
             <a:ext cx="964850" cy="649241"/>
           </a:xfrm>
           <a:prstGeom prst="rect">
@@ -4224,7 +4225,7 @@
         </p:nvSpPr>
         <p:spPr>
           <a:xfrm>
-            <a:off x="5020395" y="908094"/>
+            <a:off x="4805242" y="1210653"/>
             <a:ext cx="964850" cy="649241"/>
           </a:xfrm>
           <a:prstGeom prst="rect">
@@ -4273,7 +4274,7 @@
         </p:nvGrpSpPr>
         <p:grpSpPr>
           <a:xfrm>
-            <a:off x="323132" y="901788"/>
+            <a:off x="107979" y="1204347"/>
             <a:ext cx="744386" cy="655547"/>
             <a:chOff x="323132" y="901788"/>
             <a:chExt cx="744386" cy="655547"/>
@@ -4371,7 +4372,7 @@
         </p:nvCxnSpPr>
         <p:spPr>
           <a:xfrm>
-            <a:off x="702007" y="1949756"/>
+            <a:off x="486854" y="2252315"/>
             <a:ext cx="1133474" cy="0"/>
           </a:xfrm>
           <a:prstGeom prst="straightConnector1">
@@ -4411,7 +4412,7 @@
         </p:nvSpPr>
         <p:spPr>
           <a:xfrm>
-            <a:off x="686165" y="2013214"/>
+            <a:off x="471012" y="2315773"/>
             <a:ext cx="1180771" cy="200055"/>
           </a:xfrm>
           <a:prstGeom prst="rect">
@@ -4457,7 +4458,7 @@
         </p:nvCxnSpPr>
         <p:spPr>
           <a:xfrm>
-            <a:off x="706966" y="2219520"/>
+            <a:off x="491813" y="2522079"/>
             <a:ext cx="1125897" cy="0"/>
           </a:xfrm>
           <a:prstGeom prst="straightConnector1">
@@ -4498,7 +4499,7 @@
         </p:nvSpPr>
         <p:spPr>
           <a:xfrm>
-            <a:off x="706193" y="3152348"/>
+            <a:off x="491040" y="3454907"/>
             <a:ext cx="2368841" cy="200055"/>
           </a:xfrm>
           <a:prstGeom prst="rect">
@@ -4536,7 +4537,7 @@
         </p:nvCxnSpPr>
         <p:spPr>
           <a:xfrm flipV="1">
-            <a:off x="690611" y="3330256"/>
+            <a:off x="475458" y="3632815"/>
             <a:ext cx="2370923" cy="12369"/>
           </a:xfrm>
           <a:prstGeom prst="straightConnector1">
@@ -4577,7 +4578,7 @@
         </p:nvSpPr>
         <p:spPr>
           <a:xfrm>
-            <a:off x="3108324" y="3001272"/>
+            <a:off x="2893171" y="3303831"/>
             <a:ext cx="1180771" cy="200055"/>
           </a:xfrm>
           <a:prstGeom prst="rect">
@@ -4615,7 +4616,7 @@
         </p:nvCxnSpPr>
         <p:spPr>
           <a:xfrm>
-            <a:off x="3148828" y="3179180"/>
+            <a:off x="2933675" y="3481739"/>
             <a:ext cx="1140268" cy="0"/>
           </a:xfrm>
           <a:prstGeom prst="straightConnector1">
@@ -4658,7 +4659,7 @@
         </p:nvCxnSpPr>
         <p:spPr>
           <a:xfrm>
-            <a:off x="693739" y="2519714"/>
+            <a:off x="478586" y="2822273"/>
             <a:ext cx="2362984" cy="6838"/>
           </a:xfrm>
           <a:prstGeom prst="straightConnector1">
@@ -4700,7 +4701,7 @@
         </p:nvCxnSpPr>
         <p:spPr>
           <a:xfrm>
-            <a:off x="3165046" y="2675839"/>
+            <a:off x="2949893" y="2978398"/>
             <a:ext cx="1101265" cy="0"/>
           </a:xfrm>
           <a:prstGeom prst="straightConnector1">
@@ -4742,7 +4743,7 @@
         </p:nvCxnSpPr>
         <p:spPr>
           <a:xfrm flipV="1">
-            <a:off x="4338966" y="2770094"/>
+            <a:off x="4123813" y="3072653"/>
             <a:ext cx="1133987" cy="3232"/>
           </a:xfrm>
           <a:prstGeom prst="straightConnector1">
@@ -4784,7 +4785,7 @@
         </p:nvCxnSpPr>
         <p:spPr>
           <a:xfrm>
-            <a:off x="713747" y="3578050"/>
+            <a:off x="498594" y="3880609"/>
             <a:ext cx="2354551" cy="0"/>
           </a:xfrm>
           <a:prstGeom prst="straightConnector1">
@@ -4826,7 +4827,7 @@
         </p:nvCxnSpPr>
         <p:spPr>
           <a:xfrm flipH="1">
-            <a:off x="1938375" y="5198433"/>
+            <a:off x="1723222" y="5500992"/>
             <a:ext cx="1103472" cy="0"/>
           </a:xfrm>
           <a:prstGeom prst="straightConnector1">
@@ -4866,7 +4867,7 @@
         </p:nvSpPr>
         <p:spPr>
           <a:xfrm>
-            <a:off x="4307429" y="2446884"/>
+            <a:off x="4092276" y="2749443"/>
             <a:ext cx="1221347" cy="307777"/>
           </a:xfrm>
           <a:prstGeom prst="rect">
@@ -4910,7 +4911,7 @@
         </p:nvSpPr>
         <p:spPr>
           <a:xfrm>
-            <a:off x="1835481" y="5917097"/>
+            <a:off x="1620328" y="6219656"/>
             <a:ext cx="94593" cy="479271"/>
           </a:xfrm>
           <a:prstGeom prst="rect">
@@ -4964,7 +4965,7 @@
         </p:nvSpPr>
         <p:spPr>
           <a:xfrm>
-            <a:off x="3102214" y="4032939"/>
+            <a:off x="2887061" y="4335498"/>
             <a:ext cx="2412678" cy="200055"/>
           </a:xfrm>
           <a:prstGeom prst="rect">
@@ -5000,7 +5001,7 @@
         </p:nvSpPr>
         <p:spPr>
           <a:xfrm>
-            <a:off x="699323" y="3375689"/>
+            <a:off x="484170" y="3678248"/>
             <a:ext cx="2415116" cy="200055"/>
           </a:xfrm>
           <a:prstGeom prst="rect">
@@ -5036,7 +5037,7 @@
         </p:nvSpPr>
         <p:spPr>
           <a:xfrm>
-            <a:off x="1881553" y="4890986"/>
+            <a:off x="1666400" y="5193545"/>
             <a:ext cx="1179474" cy="307777"/>
           </a:xfrm>
           <a:prstGeom prst="rect">
@@ -5082,7 +5083,7 @@
         </p:nvCxnSpPr>
         <p:spPr>
           <a:xfrm>
-            <a:off x="3139323" y="4236717"/>
+            <a:off x="2924170" y="4539276"/>
             <a:ext cx="2299006" cy="0"/>
           </a:xfrm>
           <a:prstGeom prst="straightConnector1">
@@ -5125,7 +5126,7 @@
         </p:nvCxnSpPr>
         <p:spPr>
           <a:xfrm>
-            <a:off x="699965" y="5818439"/>
+            <a:off x="484812" y="6120998"/>
             <a:ext cx="2381295" cy="0"/>
           </a:xfrm>
           <a:prstGeom prst="straightConnector1">
@@ -5201,7 +5202,7 @@
         </p:nvSpPr>
         <p:spPr>
           <a:xfrm>
-            <a:off x="5472441" y="2686172"/>
+            <a:off x="5257288" y="2988731"/>
             <a:ext cx="94593" cy="479271"/>
           </a:xfrm>
           <a:prstGeom prst="rect">
@@ -5257,7 +5258,7 @@
         </p:nvCxnSpPr>
         <p:spPr>
           <a:xfrm>
-            <a:off x="4316365" y="3051633"/>
+            <a:off x="4101212" y="3354192"/>
             <a:ext cx="1140268" cy="0"/>
           </a:xfrm>
           <a:prstGeom prst="straightConnector1">
@@ -5298,7 +5299,7 @@
         </p:nvSpPr>
         <p:spPr>
           <a:xfrm>
-            <a:off x="3052078" y="3510309"/>
+            <a:off x="2836925" y="3812868"/>
             <a:ext cx="95006" cy="2406788"/>
           </a:xfrm>
           <a:prstGeom prst="rect">
@@ -5354,7 +5355,7 @@
         </p:nvCxnSpPr>
         <p:spPr>
           <a:xfrm>
-            <a:off x="3139323" y="3647107"/>
+            <a:off x="2924170" y="3949666"/>
             <a:ext cx="408740" cy="0"/>
           </a:xfrm>
           <a:prstGeom prst="straightConnector1">
@@ -5396,7 +5397,7 @@
         </p:nvCxnSpPr>
         <p:spPr>
           <a:xfrm flipH="1">
-            <a:off x="3139324" y="3794744"/>
+            <a:off x="2924171" y="4097303"/>
             <a:ext cx="408739" cy="0"/>
           </a:xfrm>
           <a:prstGeom prst="straightConnector1">
@@ -5438,7 +5439,7 @@
         </p:nvCxnSpPr>
         <p:spPr>
           <a:xfrm>
-            <a:off x="3548063" y="3647107"/>
+            <a:off x="3332910" y="3949666"/>
             <a:ext cx="0" cy="147637"/>
           </a:xfrm>
           <a:prstGeom prst="straightConnector1">
@@ -5478,7 +5479,7 @@
         </p:nvSpPr>
         <p:spPr>
           <a:xfrm>
-            <a:off x="3098631" y="3446430"/>
+            <a:off x="2883478" y="3748989"/>
             <a:ext cx="1217734" cy="200055"/>
           </a:xfrm>
           <a:prstGeom prst="rect">
@@ -5515,7 +5516,7 @@
         </p:nvCxnSpPr>
         <p:spPr>
           <a:xfrm>
-            <a:off x="3146182" y="3978189"/>
+            <a:off x="2931029" y="4280748"/>
             <a:ext cx="2326259" cy="0"/>
           </a:xfrm>
           <a:prstGeom prst="straightConnector1">
@@ -5555,7 +5556,7 @@
         </p:nvSpPr>
         <p:spPr>
           <a:xfrm>
-            <a:off x="3139323" y="3777753"/>
+            <a:off x="2924170" y="4080312"/>
             <a:ext cx="2370722" cy="200055"/>
           </a:xfrm>
           <a:prstGeom prst="rect">
@@ -5591,7 +5592,7 @@
         </p:nvSpPr>
         <p:spPr>
           <a:xfrm>
-            <a:off x="5477112" y="3868817"/>
+            <a:off x="5261959" y="4171376"/>
             <a:ext cx="94593" cy="479271"/>
           </a:xfrm>
           <a:prstGeom prst="rect">
@@ -5647,7 +5648,7 @@
         </p:nvCxnSpPr>
         <p:spPr>
           <a:xfrm flipV="1">
-            <a:off x="3138229" y="4530455"/>
+            <a:off x="2923076" y="4833014"/>
             <a:ext cx="1133987" cy="3232"/>
           </a:xfrm>
           <a:prstGeom prst="straightConnector1">
@@ -5687,7 +5688,7 @@
         </p:nvSpPr>
         <p:spPr>
           <a:xfrm>
-            <a:off x="3068062" y="4316127"/>
+            <a:off x="2852909" y="4618686"/>
             <a:ext cx="1221347" cy="200055"/>
           </a:xfrm>
           <a:prstGeom prst="rect">
@@ -5728,7 +5729,7 @@
         </p:nvSpPr>
         <p:spPr>
           <a:xfrm>
-            <a:off x="4253230" y="4444422"/>
+            <a:off x="4038077" y="4746981"/>
             <a:ext cx="104712" cy="648272"/>
           </a:xfrm>
           <a:prstGeom prst="rect">
@@ -5784,7 +5785,7 @@
         </p:nvCxnSpPr>
         <p:spPr>
           <a:xfrm>
-            <a:off x="3146182" y="5002156"/>
+            <a:off x="2931029" y="5304715"/>
             <a:ext cx="1104348" cy="0"/>
           </a:xfrm>
           <a:prstGeom prst="straightConnector1">
@@ -5827,7 +5828,7 @@
         </p:nvCxnSpPr>
         <p:spPr>
           <a:xfrm>
-            <a:off x="4356093" y="4622444"/>
+            <a:off x="4140940" y="4925003"/>
             <a:ext cx="1111318" cy="0"/>
           </a:xfrm>
           <a:prstGeom prst="straightConnector1">
@@ -5867,7 +5868,7 @@
         </p:nvSpPr>
         <p:spPr>
           <a:xfrm>
-            <a:off x="5466899" y="4538522"/>
+            <a:off x="5251746" y="4841081"/>
             <a:ext cx="94593" cy="479271"/>
           </a:xfrm>
           <a:prstGeom prst="rect">
@@ -5923,7 +5924,7 @@
         </p:nvCxnSpPr>
         <p:spPr>
           <a:xfrm>
-            <a:off x="4351318" y="4895441"/>
+            <a:off x="4136165" y="5198000"/>
             <a:ext cx="1140268" cy="0"/>
           </a:xfrm>
           <a:prstGeom prst="straightConnector1">
@@ -5964,7 +5965,7 @@
         </p:nvSpPr>
         <p:spPr>
           <a:xfrm>
-            <a:off x="4291668" y="4703927"/>
+            <a:off x="4076515" y="5006486"/>
             <a:ext cx="1180771" cy="200055"/>
           </a:xfrm>
           <a:prstGeom prst="rect">
@@ -6000,7 +6001,7 @@
         </p:nvSpPr>
         <p:spPr>
           <a:xfrm>
-            <a:off x="1838024" y="5076814"/>
+            <a:off x="1622871" y="5379373"/>
             <a:ext cx="94593" cy="479271"/>
           </a:xfrm>
           <a:prstGeom prst="rect">
@@ -6054,7 +6055,7 @@
         </p:nvSpPr>
         <p:spPr>
           <a:xfrm>
-            <a:off x="697548" y="5618382"/>
+            <a:off x="482395" y="5920941"/>
             <a:ext cx="2404664" cy="200055"/>
           </a:xfrm>
           <a:prstGeom prst="rect">
@@ -6092,7 +6093,7 @@
         </p:nvCxnSpPr>
         <p:spPr>
           <a:xfrm>
-            <a:off x="686165" y="6330325"/>
+            <a:off x="471012" y="6632884"/>
             <a:ext cx="1140268" cy="0"/>
           </a:xfrm>
           <a:prstGeom prst="straightConnector1">
@@ -6133,7 +6134,7 @@
         </p:nvSpPr>
         <p:spPr>
           <a:xfrm>
-            <a:off x="695608" y="5866758"/>
+            <a:off x="480455" y="6169317"/>
             <a:ext cx="1194128" cy="200055"/>
           </a:xfrm>
           <a:prstGeom prst="rect">
@@ -6171,7 +6172,7 @@
         </p:nvCxnSpPr>
         <p:spPr>
           <a:xfrm>
-            <a:off x="695609" y="6044666"/>
+            <a:off x="480456" y="6347225"/>
             <a:ext cx="1133474" cy="0"/>
           </a:xfrm>
           <a:prstGeom prst="straightConnector1">
@@ -6197,6 +6198,50 @@
           </a:fontRef>
         </p:style>
       </p:cxnSp>
+      <p:sp>
+        <p:nvSpPr>
+          <p:cNvPr id="67" name="TextBox 66">
+            <a:extLst>
+              <a:ext uri="{FF2B5EF4-FFF2-40B4-BE49-F238E27FC236}">
+                <a16:creationId xmlns:a16="http://schemas.microsoft.com/office/drawing/2014/main" id="{BFD7D96D-16A8-4362-BCD5-BAD893E384E0}"/>
+              </a:ext>
+            </a:extLst>
+          </p:cNvPr>
+          <p:cNvSpPr txBox="1"/>
+          <p:nvPr/>
+        </p:nvSpPr>
+        <p:spPr>
+          <a:xfrm>
+            <a:off x="178568" y="713938"/>
+            <a:ext cx="3089307" cy="369332"/>
+          </a:xfrm>
+          <a:prstGeom prst="rect">
+            <a:avLst/>
+          </a:prstGeom>
+          <a:noFill/>
+        </p:spPr>
+        <p:txBody>
+          <a:bodyPr wrap="none" rtlCol="0">
+            <a:spAutoFit/>
+          </a:bodyPr>
+          <a:lstStyle/>
+          <a:p>
+            <a:r>
+              <a:rPr lang="en-IE" dirty="0">
+                <a:solidFill>
+                  <a:schemeClr val="accent4"/>
+                </a:solidFill>
+              </a:rPr>
+              <a:t>Standalone and Connected</a:t>
+            </a:r>
+            <a:endParaRPr lang="en-US" dirty="0">
+              <a:solidFill>
+                <a:schemeClr val="accent4"/>
+              </a:solidFill>
+            </a:endParaRPr>
+          </a:p>
+        </p:txBody>
+      </p:sp>
     </p:spTree>
     <p:extLst>
       <p:ext uri="{BB962C8B-B14F-4D97-AF65-F5344CB8AC3E}">
@@ -7682,12 +7727,386 @@
           </a:p>
         </p:txBody>
       </p:sp>
+      <p:sp>
+        <p:nvSpPr>
+          <p:cNvPr id="3" name="Rectangle 2">
+            <a:extLst>
+              <a:ext uri="{FF2B5EF4-FFF2-40B4-BE49-F238E27FC236}">
+                <a16:creationId xmlns:a16="http://schemas.microsoft.com/office/drawing/2014/main" id="{941CC243-0C7A-44C8-A289-F5F9A21A45AC}"/>
+              </a:ext>
+            </a:extLst>
+          </p:cNvPr>
+          <p:cNvSpPr/>
+          <p:nvPr/>
+        </p:nvSpPr>
+        <p:spPr>
+          <a:xfrm rot="1944063">
+            <a:off x="8097245" y="1032402"/>
+            <a:ext cx="4121642" cy="923330"/>
+          </a:xfrm>
+          <a:prstGeom prst="rect">
+            <a:avLst/>
+          </a:prstGeom>
+          <a:noFill/>
+        </p:spPr>
+        <p:txBody>
+          <a:bodyPr wrap="none" lIns="91440" tIns="45720" rIns="91440" bIns="45720">
+            <a:spAutoFit/>
+          </a:bodyPr>
+          <a:lstStyle/>
+          <a:p>
+            <a:pPr algn="ctr"/>
+            <a:r>
+              <a:rPr lang="en-US" sz="5400" b="1" cap="none" spc="0" dirty="0">
+                <a:ln w="9525">
+                  <a:solidFill>
+                    <a:schemeClr val="bg1"/>
+                  </a:solidFill>
+                  <a:prstDash val="solid"/>
+                </a:ln>
+                <a:solidFill>
+                  <a:schemeClr val="accent5"/>
+                </a:solidFill>
+                <a:effectLst>
+                  <a:outerShdw blurRad="12700" dist="38100" dir="2700000" algn="tl" rotWithShape="0">
+                    <a:schemeClr val="accent5">
+                      <a:lumMod val="60000"/>
+                      <a:lumOff val="40000"/>
+                    </a:schemeClr>
+                  </a:outerShdw>
+                </a:effectLst>
+              </a:rPr>
+              <a:t>Old version</a:t>
+            </a:r>
+          </a:p>
+        </p:txBody>
+      </p:sp>
+    </p:spTree>
+    <p:extLst>
+      <p:ext uri="{BB962C8B-B14F-4D97-AF65-F5344CB8AC3E}">
+        <p14:creationId xmlns:p14="http://schemas.microsoft.com/office/powerpoint/2010/main" val="2401413401"/>
+      </p:ext>
+    </p:extLst>
+  </p:cSld>
+  <p:clrMapOvr>
+    <a:masterClrMapping/>
+  </p:clrMapOvr>
+</p:sld>
+</file>
+
+<file path=ppt/slides/slide12.xml><?xml version="1.0" encoding="utf-8"?>
+<p:sld xmlns:a="http://schemas.openxmlformats.org/drawingml/2006/main" xmlns:r="http://schemas.openxmlformats.org/officeDocument/2006/relationships" xmlns:p="http://schemas.openxmlformats.org/presentationml/2006/main">
+  <p:cSld>
+    <p:spTree>
+      <p:nvGrpSpPr>
+        <p:cNvPr id="1" name=""/>
+        <p:cNvGrpSpPr/>
+        <p:nvPr/>
+      </p:nvGrpSpPr>
+      <p:grpSpPr>
+        <a:xfrm>
+          <a:off x="0" y="0"/>
+          <a:ext cx="0" cy="0"/>
+          <a:chOff x="0" y="0"/>
+          <a:chExt cx="0" cy="0"/>
+        </a:xfrm>
+      </p:grpSpPr>
+      <p:sp>
+        <p:nvSpPr>
+          <p:cNvPr id="2" name="Title 162">
+            <a:extLst>
+              <a:ext uri="{FF2B5EF4-FFF2-40B4-BE49-F238E27FC236}">
+                <a16:creationId xmlns:a16="http://schemas.microsoft.com/office/drawing/2014/main" id="{A1AECB97-5AF1-4916-B851-9A4A4A477D6D}"/>
+              </a:ext>
+            </a:extLst>
+          </p:cNvPr>
+          <p:cNvSpPr txBox="1">
+            <a:spLocks/>
+          </p:cNvSpPr>
+          <p:nvPr/>
+        </p:nvSpPr>
+        <p:spPr>
+          <a:xfrm>
+            <a:off x="0" y="0"/>
+            <a:ext cx="5529432" cy="605446"/>
+          </a:xfrm>
+          <a:prstGeom prst="rect">
+            <a:avLst/>
+          </a:prstGeom>
+        </p:spPr>
+        <p:txBody>
+          <a:bodyPr vert="horz" lIns="91440" tIns="45720" rIns="91440" bIns="45720" rtlCol="0" anchor="ctr">
+            <a:normAutofit/>
+          </a:bodyPr>
+          <a:lstStyle>
+            <a:lvl1pPr algn="l" defTabSz="914400" rtl="0" eaLnBrk="1" latinLnBrk="0" hangingPunct="1">
+              <a:lnSpc>
+                <a:spcPct val="90000"/>
+              </a:lnSpc>
+              <a:spcBef>
+                <a:spcPct val="0"/>
+              </a:spcBef>
+              <a:buNone/>
+              <a:defRPr sz="4400" kern="1200">
+                <a:solidFill>
+                  <a:schemeClr val="tx1"/>
+                </a:solidFill>
+                <a:latin typeface="+mj-lt"/>
+                <a:ea typeface="+mj-ea"/>
+                <a:cs typeface="+mj-cs"/>
+              </a:defRPr>
+            </a:lvl1pPr>
+          </a:lstStyle>
+          <a:p>
+            <a:r>
+              <a:rPr lang="en-US" sz="2800" dirty="0"/>
+              <a:t>mx4pc-traffic-service</a:t>
+            </a:r>
+          </a:p>
+        </p:txBody>
+      </p:sp>
+      <p:sp>
+        <p:nvSpPr>
+          <p:cNvPr id="4" name="Rectangle 3">
+            <a:extLst>
+              <a:ext uri="{FF2B5EF4-FFF2-40B4-BE49-F238E27FC236}">
+                <a16:creationId xmlns:a16="http://schemas.microsoft.com/office/drawing/2014/main" id="{AB4496DC-FBB9-427D-A217-5D36B4BFF022}"/>
+              </a:ext>
+            </a:extLst>
+          </p:cNvPr>
+          <p:cNvSpPr/>
+          <p:nvPr/>
+        </p:nvSpPr>
+        <p:spPr>
+          <a:xfrm>
+            <a:off x="3604464" y="2279696"/>
+            <a:ext cx="964850" cy="649241"/>
+          </a:xfrm>
+          <a:prstGeom prst="rect">
+            <a:avLst/>
+          </a:prstGeom>
+        </p:spPr>
+        <p:style>
+          <a:lnRef idx="2">
+            <a:schemeClr val="accent1">
+              <a:shade val="50000"/>
+            </a:schemeClr>
+          </a:lnRef>
+          <a:fillRef idx="1">
+            <a:schemeClr val="accent1"/>
+          </a:fillRef>
+          <a:effectRef idx="0">
+            <a:schemeClr val="accent1"/>
+          </a:effectRef>
+          <a:fontRef idx="minor">
+            <a:schemeClr val="lt1"/>
+          </a:fontRef>
+        </p:style>
+        <p:txBody>
+          <a:bodyPr rtlCol="0" anchor="ctr"/>
+          <a:lstStyle/>
+          <a:p>
+            <a:pPr algn="ctr"/>
+            <a:r>
+              <a:rPr lang="en-US" sz="1000" dirty="0"/>
+              <a:t>Load Balancer</a:t>
+            </a:r>
+          </a:p>
+        </p:txBody>
+      </p:sp>
+      <p:sp>
+        <p:nvSpPr>
+          <p:cNvPr id="6" name="Rectangle 5">
+            <a:extLst>
+              <a:ext uri="{FF2B5EF4-FFF2-40B4-BE49-F238E27FC236}">
+                <a16:creationId xmlns:a16="http://schemas.microsoft.com/office/drawing/2014/main" id="{5FCCBF27-43A6-4212-838B-4DA09A023545}"/>
+              </a:ext>
+            </a:extLst>
+          </p:cNvPr>
+          <p:cNvSpPr/>
+          <p:nvPr/>
+        </p:nvSpPr>
+        <p:spPr>
+          <a:xfrm>
+            <a:off x="5218618" y="2279696"/>
+            <a:ext cx="964850" cy="649241"/>
+          </a:xfrm>
+          <a:prstGeom prst="rect">
+            <a:avLst/>
+          </a:prstGeom>
+        </p:spPr>
+        <p:style>
+          <a:lnRef idx="2">
+            <a:schemeClr val="accent1">
+              <a:shade val="50000"/>
+            </a:schemeClr>
+          </a:lnRef>
+          <a:fillRef idx="1">
+            <a:schemeClr val="accent1"/>
+          </a:fillRef>
+          <a:effectRef idx="0">
+            <a:schemeClr val="accent1"/>
+          </a:effectRef>
+          <a:fontRef idx="minor">
+            <a:schemeClr val="lt1"/>
+          </a:fontRef>
+        </p:style>
+        <p:txBody>
+          <a:bodyPr rtlCol="0" anchor="ctr"/>
+          <a:lstStyle/>
+          <a:p>
+            <a:pPr algn="ctr"/>
+            <a:r>
+              <a:rPr lang="en-US" sz="1000" dirty="0"/>
+              <a:t>Kubernetes Service</a:t>
+            </a:r>
+          </a:p>
+        </p:txBody>
+      </p:sp>
+      <p:sp>
+        <p:nvSpPr>
+          <p:cNvPr id="8" name="Rectangle 7">
+            <a:extLst>
+              <a:ext uri="{FF2B5EF4-FFF2-40B4-BE49-F238E27FC236}">
+                <a16:creationId xmlns:a16="http://schemas.microsoft.com/office/drawing/2014/main" id="{76AB171E-D8DB-4A62-BBCB-E4A798B1D18B}"/>
+              </a:ext>
+            </a:extLst>
+          </p:cNvPr>
+          <p:cNvSpPr/>
+          <p:nvPr/>
+        </p:nvSpPr>
+        <p:spPr>
+          <a:xfrm>
+            <a:off x="6832771" y="2279696"/>
+            <a:ext cx="964850" cy="649241"/>
+          </a:xfrm>
+          <a:prstGeom prst="rect">
+            <a:avLst/>
+          </a:prstGeom>
+        </p:spPr>
+        <p:style>
+          <a:lnRef idx="2">
+            <a:schemeClr val="accent1">
+              <a:shade val="50000"/>
+            </a:schemeClr>
+          </a:lnRef>
+          <a:fillRef idx="1">
+            <a:schemeClr val="accent1"/>
+          </a:fillRef>
+          <a:effectRef idx="0">
+            <a:schemeClr val="accent1"/>
+          </a:effectRef>
+          <a:fontRef idx="minor">
+            <a:schemeClr val="lt1"/>
+          </a:fontRef>
+        </p:style>
+        <p:txBody>
+          <a:bodyPr rtlCol="0" anchor="ctr"/>
+          <a:lstStyle/>
+          <a:p>
+            <a:pPr algn="ctr"/>
+            <a:r>
+              <a:rPr lang="en-IE" sz="1000" dirty="0"/>
+              <a:t>Mendix App Pod</a:t>
+            </a:r>
+            <a:endParaRPr lang="en-US" sz="1000" dirty="0"/>
+          </a:p>
+        </p:txBody>
+      </p:sp>
+      <p:cxnSp>
+        <p:nvCxnSpPr>
+          <p:cNvPr id="9" name="Straight Arrow Connector 8">
+            <a:extLst>
+              <a:ext uri="{FF2B5EF4-FFF2-40B4-BE49-F238E27FC236}">
+                <a16:creationId xmlns:a16="http://schemas.microsoft.com/office/drawing/2014/main" id="{D59EDD09-34BF-4248-8E7F-20745E5E96C6}"/>
+              </a:ext>
+            </a:extLst>
+          </p:cNvPr>
+          <p:cNvCxnSpPr>
+            <a:cxnSpLocks/>
+            <a:stCxn id="4" idx="3"/>
+            <a:endCxn id="6" idx="1"/>
+          </p:cNvCxnSpPr>
+          <p:nvPr/>
+        </p:nvCxnSpPr>
+        <p:spPr>
+          <a:xfrm>
+            <a:off x="4569314" y="2604317"/>
+            <a:ext cx="649304" cy="0"/>
+          </a:xfrm>
+          <a:prstGeom prst="straightConnector1">
+            <a:avLst/>
+          </a:prstGeom>
+          <a:ln>
+            <a:headEnd type="none"/>
+            <a:tailEnd type="triangle"/>
+          </a:ln>
+        </p:spPr>
+        <p:style>
+          <a:lnRef idx="3">
+            <a:schemeClr val="accent1"/>
+          </a:lnRef>
+          <a:fillRef idx="0">
+            <a:schemeClr val="accent1"/>
+          </a:fillRef>
+          <a:effectRef idx="2">
+            <a:schemeClr val="accent1"/>
+          </a:effectRef>
+          <a:fontRef idx="minor">
+            <a:schemeClr val="tx1"/>
+          </a:fontRef>
+        </p:style>
+      </p:cxnSp>
+      <p:cxnSp>
+        <p:nvCxnSpPr>
+          <p:cNvPr id="11" name="Straight Arrow Connector 10">
+            <a:extLst>
+              <a:ext uri="{FF2B5EF4-FFF2-40B4-BE49-F238E27FC236}">
+                <a16:creationId xmlns:a16="http://schemas.microsoft.com/office/drawing/2014/main" id="{7D35EB5B-6B6A-4922-88A2-DA6405588E42}"/>
+              </a:ext>
+            </a:extLst>
+          </p:cNvPr>
+          <p:cNvCxnSpPr>
+            <a:cxnSpLocks/>
+            <a:stCxn id="6" idx="3"/>
+            <a:endCxn id="8" idx="1"/>
+          </p:cNvCxnSpPr>
+          <p:nvPr/>
+        </p:nvCxnSpPr>
+        <p:spPr>
+          <a:xfrm>
+            <a:off x="6183468" y="2604317"/>
+            <a:ext cx="649303" cy="0"/>
+          </a:xfrm>
+          <a:prstGeom prst="straightConnector1">
+            <a:avLst/>
+          </a:prstGeom>
+          <a:ln>
+            <a:headEnd type="none"/>
+            <a:tailEnd type="triangle"/>
+          </a:ln>
+        </p:spPr>
+        <p:style>
+          <a:lnRef idx="3">
+            <a:schemeClr val="accent1"/>
+          </a:lnRef>
+          <a:fillRef idx="0">
+            <a:schemeClr val="accent1"/>
+          </a:fillRef>
+          <a:effectRef idx="2">
+            <a:schemeClr val="accent1"/>
+          </a:effectRef>
+          <a:fontRef idx="minor">
+            <a:schemeClr val="tx1"/>
+          </a:fontRef>
+        </p:style>
+      </p:cxnSp>
       <p:pic>
         <p:nvPicPr>
-          <p:cNvPr id="15" name="Graphic 14" descr="Browser window with solid fill">
-            <a:extLst>
-              <a:ext uri="{FF2B5EF4-FFF2-40B4-BE49-F238E27FC236}">
-                <a16:creationId xmlns:a16="http://schemas.microsoft.com/office/drawing/2014/main" id="{C3F1D673-CBF5-47D3-809B-AD6877B451AD}"/>
+          <p:cNvPr id="20" name="Graphic 19" descr="Browser window with solid fill">
+            <a:extLst>
+              <a:ext uri="{FF2B5EF4-FFF2-40B4-BE49-F238E27FC236}">
+                <a16:creationId xmlns:a16="http://schemas.microsoft.com/office/drawing/2014/main" id="{4454AAF6-0942-43C0-B9AA-73DB60AF7679}"/>
               </a:ext>
             </a:extLst>
           </p:cNvPr>
@@ -7713,7 +8132,7 @@
         </p:blipFill>
         <p:spPr>
           <a:xfrm>
-            <a:off x="2033935" y="3295151"/>
+            <a:off x="2033935" y="2085702"/>
             <a:ext cx="1037230" cy="1037230"/>
           </a:xfrm>
           <a:prstGeom prst="rect">
@@ -7721,51 +8140,12 @@
           </a:prstGeom>
         </p:spPr>
       </p:pic>
-      <p:pic>
-        <p:nvPicPr>
-          <p:cNvPr id="16" name="Graphic 15" descr="Browser window with solid fill">
-            <a:extLst>
-              <a:ext uri="{FF2B5EF4-FFF2-40B4-BE49-F238E27FC236}">
-                <a16:creationId xmlns:a16="http://schemas.microsoft.com/office/drawing/2014/main" id="{7EEAC4BB-A4A7-4DCB-B1FA-86F373D54D99}"/>
-              </a:ext>
-            </a:extLst>
-          </p:cNvPr>
-          <p:cNvPicPr>
-            <a:picLocks noChangeAspect="1"/>
-          </p:cNvPicPr>
-          <p:nvPr/>
-        </p:nvPicPr>
-        <p:blipFill>
-          <a:blip r:embed="rId2">
-            <a:extLst>
-              <a:ext uri="{28A0092B-C50C-407E-A947-70E740481C1C}">
-                <a14:useLocalDpi xmlns:a14="http://schemas.microsoft.com/office/drawing/2010/main" val="0"/>
-              </a:ext>
-              <a:ext uri="{96DAC541-7B7A-43D3-8B79-37D633B846F1}">
-                <asvg:svgBlip xmlns:asvg="http://schemas.microsoft.com/office/drawing/2016/SVG/main" r:embed="rId3"/>
-              </a:ext>
-            </a:extLst>
-          </a:blip>
-          <a:stretch>
-            <a:fillRect/>
-          </a:stretch>
-        </p:blipFill>
-        <p:spPr>
-          <a:xfrm>
-            <a:off x="2033935" y="937279"/>
-            <a:ext cx="1037230" cy="1037230"/>
-          </a:xfrm>
-          <a:prstGeom prst="rect">
-            <a:avLst/>
-          </a:prstGeom>
-        </p:spPr>
-      </p:pic>
-      <p:sp>
-        <p:nvSpPr>
-          <p:cNvPr id="17" name="Rectangle 16">
-            <a:extLst>
-              <a:ext uri="{FF2B5EF4-FFF2-40B4-BE49-F238E27FC236}">
-                <a16:creationId xmlns:a16="http://schemas.microsoft.com/office/drawing/2014/main" id="{9202CB4E-05B5-494E-807B-4AC243A31D98}"/>
+      <p:sp>
+        <p:nvSpPr>
+          <p:cNvPr id="21" name="Arrow: Right 20">
+            <a:extLst>
+              <a:ext uri="{FF2B5EF4-FFF2-40B4-BE49-F238E27FC236}">
+                <a16:creationId xmlns:a16="http://schemas.microsoft.com/office/drawing/2014/main" id="{A21BD5BD-4BB2-45B4-9F64-78E81B8EA43D}"/>
               </a:ext>
             </a:extLst>
           </p:cNvPr>
@@ -7774,57 +8154,8 @@
         </p:nvSpPr>
         <p:spPr>
           <a:xfrm>
-            <a:off x="3604464" y="1131273"/>
-            <a:ext cx="964850" cy="649241"/>
-          </a:xfrm>
-          <a:prstGeom prst="rect">
-            <a:avLst/>
-          </a:prstGeom>
-        </p:spPr>
-        <p:style>
-          <a:lnRef idx="2">
-            <a:schemeClr val="accent1">
-              <a:shade val="50000"/>
-            </a:schemeClr>
-          </a:lnRef>
-          <a:fillRef idx="1">
-            <a:schemeClr val="accent1"/>
-          </a:fillRef>
-          <a:effectRef idx="0">
-            <a:schemeClr val="accent1"/>
-          </a:effectRef>
-          <a:fontRef idx="minor">
-            <a:schemeClr val="lt1"/>
-          </a:fontRef>
-        </p:style>
-        <p:txBody>
-          <a:bodyPr rtlCol="0" anchor="ctr"/>
-          <a:lstStyle/>
-          <a:p>
-            <a:pPr algn="ctr"/>
-            <a:r>
-              <a:rPr lang="en-US" sz="1000" dirty="0"/>
-              <a:t>Load Balancer</a:t>
-            </a:r>
-          </a:p>
-        </p:txBody>
-      </p:sp>
-      <p:sp>
-        <p:nvSpPr>
-          <p:cNvPr id="18" name="Arrow: Right 17">
-            <a:extLst>
-              <a:ext uri="{FF2B5EF4-FFF2-40B4-BE49-F238E27FC236}">
-                <a16:creationId xmlns:a16="http://schemas.microsoft.com/office/drawing/2014/main" id="{166B363A-61EA-4A8F-B14E-FB9C73A49A21}"/>
-              </a:ext>
-            </a:extLst>
-          </p:cNvPr>
-          <p:cNvSpPr/>
-          <p:nvPr/>
-        </p:nvSpPr>
-        <p:spPr>
-          <a:xfrm>
-            <a:off x="3001753" y="1299594"/>
-            <a:ext cx="602711" cy="259308"/>
+            <a:off x="3005419" y="2474662"/>
+            <a:ext cx="599046" cy="259308"/>
           </a:xfrm>
           <a:prstGeom prst="rightArrow">
             <a:avLst/>
@@ -7865,10 +8196,46 @@
       </p:sp>
       <p:sp>
         <p:nvSpPr>
-          <p:cNvPr id="19" name="Arrow: Right 18">
-            <a:extLst>
-              <a:ext uri="{FF2B5EF4-FFF2-40B4-BE49-F238E27FC236}">
-                <a16:creationId xmlns:a16="http://schemas.microsoft.com/office/drawing/2014/main" id="{5191BB73-E7ED-4F4D-ABED-B3E6DC55A2B2}"/>
+          <p:cNvPr id="22" name="TextBox 21">
+            <a:extLst>
+              <a:ext uri="{FF2B5EF4-FFF2-40B4-BE49-F238E27FC236}">
+                <a16:creationId xmlns:a16="http://schemas.microsoft.com/office/drawing/2014/main" id="{8F7E756E-D9A7-45CD-8EC4-14991100F9C2}"/>
+              </a:ext>
+            </a:extLst>
+          </p:cNvPr>
+          <p:cNvSpPr txBox="1"/>
+          <p:nvPr/>
+        </p:nvSpPr>
+        <p:spPr>
+          <a:xfrm>
+            <a:off x="2033935" y="2928936"/>
+            <a:ext cx="1037230" cy="200055"/>
+          </a:xfrm>
+          <a:prstGeom prst="rect">
+            <a:avLst/>
+          </a:prstGeom>
+          <a:noFill/>
+        </p:spPr>
+        <p:txBody>
+          <a:bodyPr wrap="square" rtlCol="0">
+            <a:spAutoFit/>
+          </a:bodyPr>
+          <a:lstStyle/>
+          <a:p>
+            <a:pPr algn="ctr"/>
+            <a:r>
+              <a:rPr lang="en-US" sz="700" dirty="0"/>
+              <a:t>Web Browser</a:t>
+            </a:r>
+          </a:p>
+        </p:txBody>
+      </p:sp>
+      <p:sp>
+        <p:nvSpPr>
+          <p:cNvPr id="12" name="Rectangle 11">
+            <a:extLst>
+              <a:ext uri="{FF2B5EF4-FFF2-40B4-BE49-F238E27FC236}">
+                <a16:creationId xmlns:a16="http://schemas.microsoft.com/office/drawing/2014/main" id="{72FA7ACC-843D-4938-86DF-C55DA90E5314}"/>
               </a:ext>
             </a:extLst>
           </p:cNvPr>
@@ -7876,286 +8243,51 @@
           <p:nvPr/>
         </p:nvSpPr>
         <p:spPr>
-          <a:xfrm rot="18630752">
-            <a:off x="2856733" y="3342622"/>
-            <a:ext cx="1310161" cy="259308"/>
-          </a:xfrm>
-          <a:prstGeom prst="rightArrow">
-            <a:avLst>
-              <a:gd name="adj1" fmla="val 50000"/>
-              <a:gd name="adj2" fmla="val 54864"/>
-            </a:avLst>
-          </a:prstGeom>
-          <a:solidFill>
-            <a:schemeClr val="bg1"/>
-          </a:solidFill>
-          <a:ln>
-            <a:solidFill>
-              <a:schemeClr val="accent1"/>
-            </a:solidFill>
-          </a:ln>
-        </p:spPr>
-        <p:style>
-          <a:lnRef idx="2">
-            <a:schemeClr val="accent1">
-              <a:shade val="50000"/>
-            </a:schemeClr>
-          </a:lnRef>
-          <a:fillRef idx="1">
-            <a:schemeClr val="accent1"/>
-          </a:fillRef>
-          <a:effectRef idx="0">
-            <a:schemeClr val="accent1"/>
-          </a:effectRef>
-          <a:fontRef idx="minor">
-            <a:schemeClr val="lt1"/>
-          </a:fontRef>
-        </p:style>
-        <p:txBody>
-          <a:bodyPr rtlCol="0" anchor="ctr"/>
+          <a:xfrm rot="1944063">
+            <a:off x="8097245" y="1032402"/>
+            <a:ext cx="4121642" cy="923330"/>
+          </a:xfrm>
+          <a:prstGeom prst="rect">
+            <a:avLst/>
+          </a:prstGeom>
+          <a:noFill/>
+        </p:spPr>
+        <p:txBody>
+          <a:bodyPr wrap="none" lIns="91440" tIns="45720" rIns="91440" bIns="45720">
+            <a:spAutoFit/>
+          </a:bodyPr>
           <a:lstStyle/>
           <a:p>
             <a:pPr algn="ctr"/>
-            <a:endParaRPr lang="en-US"/>
-          </a:p>
-        </p:txBody>
-      </p:sp>
-      <p:cxnSp>
-        <p:nvCxnSpPr>
-          <p:cNvPr id="23" name="Straight Arrow Connector 22">
-            <a:extLst>
-              <a:ext uri="{FF2B5EF4-FFF2-40B4-BE49-F238E27FC236}">
-                <a16:creationId xmlns:a16="http://schemas.microsoft.com/office/drawing/2014/main" id="{1D93F440-99CB-44B4-8A57-192448AE37C4}"/>
-              </a:ext>
-            </a:extLst>
-          </p:cNvPr>
-          <p:cNvCxnSpPr>
-            <a:cxnSpLocks/>
-            <a:stCxn id="17" idx="3"/>
-            <a:endCxn id="5" idx="0"/>
-          </p:cNvCxnSpPr>
-          <p:nvPr/>
-        </p:nvCxnSpPr>
-        <p:spPr>
-          <a:xfrm>
-            <a:off x="4569314" y="1455894"/>
-            <a:ext cx="1131729" cy="823802"/>
-          </a:xfrm>
-          <a:prstGeom prst="straightConnector1">
-            <a:avLst/>
-          </a:prstGeom>
-          <a:ln>
-            <a:headEnd type="none"/>
-            <a:tailEnd type="triangle"/>
-          </a:ln>
-        </p:spPr>
-        <p:style>
-          <a:lnRef idx="3">
-            <a:schemeClr val="accent1"/>
-          </a:lnRef>
-          <a:fillRef idx="0">
-            <a:schemeClr val="accent1"/>
-          </a:fillRef>
-          <a:effectRef idx="2">
-            <a:schemeClr val="accent1"/>
-          </a:effectRef>
-          <a:fontRef idx="minor">
-            <a:schemeClr val="tx1"/>
-          </a:fontRef>
-        </p:style>
-      </p:cxnSp>
-      <p:sp>
-        <p:nvSpPr>
-          <p:cNvPr id="24" name="Rectangle 23">
-            <a:extLst>
-              <a:ext uri="{FF2B5EF4-FFF2-40B4-BE49-F238E27FC236}">
-                <a16:creationId xmlns:a16="http://schemas.microsoft.com/office/drawing/2014/main" id="{B3BB7DA8-700C-4525-A8DD-6F72BF778B4B}"/>
-              </a:ext>
-            </a:extLst>
-          </p:cNvPr>
-          <p:cNvSpPr/>
-          <p:nvPr/>
-        </p:nvSpPr>
-        <p:spPr>
-          <a:xfrm>
-            <a:off x="8446925" y="3489145"/>
-            <a:ext cx="964850" cy="649241"/>
-          </a:xfrm>
-          <a:prstGeom prst="rect">
-            <a:avLst/>
-          </a:prstGeom>
-        </p:spPr>
-        <p:style>
-          <a:lnRef idx="2">
-            <a:schemeClr val="accent1">
-              <a:shade val="50000"/>
-            </a:schemeClr>
-          </a:lnRef>
-          <a:fillRef idx="1">
-            <a:schemeClr val="accent1"/>
-          </a:fillRef>
-          <a:effectRef idx="0">
-            <a:schemeClr val="accent1"/>
-          </a:effectRef>
-          <a:fontRef idx="minor">
-            <a:schemeClr val="lt1"/>
-          </a:fontRef>
-        </p:style>
-        <p:txBody>
-          <a:bodyPr rtlCol="0" anchor="ctr"/>
-          <a:lstStyle/>
-          <a:p>
-            <a:pPr algn="ctr"/>
-            <a:r>
-              <a:rPr lang="en-IE" sz="1000" dirty="0"/>
-              <a:t>Mendix App Pod</a:t>
-            </a:r>
-            <a:endParaRPr lang="en-US" sz="1000" dirty="0"/>
-          </a:p>
-        </p:txBody>
-      </p:sp>
-      <p:sp>
-        <p:nvSpPr>
-          <p:cNvPr id="25" name="Rectangle 24">
-            <a:extLst>
-              <a:ext uri="{FF2B5EF4-FFF2-40B4-BE49-F238E27FC236}">
-                <a16:creationId xmlns:a16="http://schemas.microsoft.com/office/drawing/2014/main" id="{892465C8-D68A-43CB-A039-7448B6629ABF}"/>
-              </a:ext>
-            </a:extLst>
-          </p:cNvPr>
-          <p:cNvSpPr/>
-          <p:nvPr/>
-        </p:nvSpPr>
-        <p:spPr>
-          <a:xfrm>
-            <a:off x="8446925" y="1125346"/>
-            <a:ext cx="964850" cy="649241"/>
-          </a:xfrm>
-          <a:prstGeom prst="rect">
-            <a:avLst/>
-          </a:prstGeom>
-        </p:spPr>
-        <p:style>
-          <a:lnRef idx="2">
-            <a:schemeClr val="accent1">
-              <a:shade val="50000"/>
-            </a:schemeClr>
-          </a:lnRef>
-          <a:fillRef idx="1">
-            <a:schemeClr val="accent1"/>
-          </a:fillRef>
-          <a:effectRef idx="0">
-            <a:schemeClr val="accent1"/>
-          </a:effectRef>
-          <a:fontRef idx="minor">
-            <a:schemeClr val="lt1"/>
-          </a:fontRef>
-        </p:style>
-        <p:txBody>
-          <a:bodyPr rtlCol="0" anchor="ctr"/>
-          <a:lstStyle/>
-          <a:p>
-            <a:pPr algn="ctr"/>
-            <a:r>
-              <a:rPr lang="en-IE" sz="1000" dirty="0"/>
-              <a:t>Mendix App Pod</a:t>
-            </a:r>
-            <a:endParaRPr lang="en-US" sz="1000" dirty="0"/>
-          </a:p>
-        </p:txBody>
-      </p:sp>
-      <p:cxnSp>
-        <p:nvCxnSpPr>
-          <p:cNvPr id="27" name="Straight Arrow Connector 26">
-            <a:extLst>
-              <a:ext uri="{FF2B5EF4-FFF2-40B4-BE49-F238E27FC236}">
-                <a16:creationId xmlns:a16="http://schemas.microsoft.com/office/drawing/2014/main" id="{23206046-042D-49C4-86CA-9178935B1DE8}"/>
-              </a:ext>
-            </a:extLst>
-          </p:cNvPr>
-          <p:cNvCxnSpPr>
-            <a:cxnSpLocks/>
-            <a:stCxn id="6" idx="3"/>
-            <a:endCxn id="25" idx="1"/>
-          </p:cNvCxnSpPr>
-          <p:nvPr/>
-        </p:nvCxnSpPr>
-        <p:spPr>
-          <a:xfrm flipV="1">
-            <a:off x="7797622" y="1449967"/>
-            <a:ext cx="649303" cy="1154350"/>
-          </a:xfrm>
-          <a:prstGeom prst="straightConnector1">
-            <a:avLst/>
-          </a:prstGeom>
-          <a:ln>
-            <a:headEnd type="none"/>
-            <a:tailEnd type="triangle"/>
-          </a:ln>
-        </p:spPr>
-        <p:style>
-          <a:lnRef idx="3">
-            <a:schemeClr val="accent1"/>
-          </a:lnRef>
-          <a:fillRef idx="0">
-            <a:schemeClr val="accent1"/>
-          </a:fillRef>
-          <a:effectRef idx="2">
-            <a:schemeClr val="accent1"/>
-          </a:effectRef>
-          <a:fontRef idx="minor">
-            <a:schemeClr val="tx1"/>
-          </a:fontRef>
-        </p:style>
-      </p:cxnSp>
-      <p:cxnSp>
-        <p:nvCxnSpPr>
-          <p:cNvPr id="28" name="Straight Arrow Connector 27">
-            <a:extLst>
-              <a:ext uri="{FF2B5EF4-FFF2-40B4-BE49-F238E27FC236}">
-                <a16:creationId xmlns:a16="http://schemas.microsoft.com/office/drawing/2014/main" id="{857C2C73-131F-4CF4-9F68-8D81D3A5ECC9}"/>
-              </a:ext>
-            </a:extLst>
-          </p:cNvPr>
-          <p:cNvCxnSpPr>
-            <a:cxnSpLocks/>
-            <a:stCxn id="6" idx="3"/>
-            <a:endCxn id="24" idx="1"/>
-          </p:cNvCxnSpPr>
-          <p:nvPr/>
-        </p:nvCxnSpPr>
-        <p:spPr>
-          <a:xfrm>
-            <a:off x="7797622" y="2604317"/>
-            <a:ext cx="649303" cy="1209449"/>
-          </a:xfrm>
-          <a:prstGeom prst="straightConnector1">
-            <a:avLst/>
-          </a:prstGeom>
-          <a:ln>
-            <a:headEnd type="none"/>
-            <a:tailEnd type="triangle"/>
-          </a:ln>
-        </p:spPr>
-        <p:style>
-          <a:lnRef idx="3">
-            <a:schemeClr val="accent1"/>
-          </a:lnRef>
-          <a:fillRef idx="0">
-            <a:schemeClr val="accent1"/>
-          </a:fillRef>
-          <a:effectRef idx="2">
-            <a:schemeClr val="accent1"/>
-          </a:effectRef>
-          <a:fontRef idx="minor">
-            <a:schemeClr val="tx1"/>
-          </a:fontRef>
-        </p:style>
-      </p:cxnSp>
+            <a:r>
+              <a:rPr lang="en-US" sz="5400" b="1" cap="none" spc="0" dirty="0">
+                <a:ln w="9525">
+                  <a:solidFill>
+                    <a:schemeClr val="bg1"/>
+                  </a:solidFill>
+                  <a:prstDash val="solid"/>
+                </a:ln>
+                <a:solidFill>
+                  <a:schemeClr val="accent5"/>
+                </a:solidFill>
+                <a:effectLst>
+                  <a:outerShdw blurRad="12700" dist="38100" dir="2700000" algn="tl" rotWithShape="0">
+                    <a:schemeClr val="accent5">
+                      <a:lumMod val="60000"/>
+                      <a:lumOff val="40000"/>
+                    </a:schemeClr>
+                  </a:outerShdw>
+                </a:effectLst>
+              </a:rPr>
+              <a:t>Old version</a:t>
+            </a:r>
+          </a:p>
+        </p:txBody>
+      </p:sp>
     </p:spTree>
     <p:extLst>
       <p:ext uri="{BB962C8B-B14F-4D97-AF65-F5344CB8AC3E}">
-        <p14:creationId xmlns:p14="http://schemas.microsoft.com/office/powerpoint/2010/main" val="844551964"/>
+        <p14:creationId xmlns:p14="http://schemas.microsoft.com/office/powerpoint/2010/main" val="3587132095"/>
       </p:ext>
     </p:extLst>
   </p:cSld>
@@ -12784,7 +12916,7 @@
         </p:nvCxnSpPr>
         <p:spPr>
           <a:xfrm>
-            <a:off x="5519738" y="1557338"/>
+            <a:off x="5513015" y="1906961"/>
             <a:ext cx="0" cy="4925443"/>
           </a:xfrm>
           <a:prstGeom prst="line">
@@ -12831,7 +12963,7 @@
         </p:nvCxnSpPr>
         <p:spPr>
           <a:xfrm>
-            <a:off x="4295775" y="1557335"/>
+            <a:off x="4289052" y="1906958"/>
             <a:ext cx="0" cy="4925443"/>
           </a:xfrm>
           <a:prstGeom prst="line">
@@ -12878,7 +13010,7 @@
         </p:nvCxnSpPr>
         <p:spPr>
           <a:xfrm>
-            <a:off x="3108325" y="1557338"/>
+            <a:off x="3101602" y="1906961"/>
             <a:ext cx="0" cy="4925443"/>
           </a:xfrm>
           <a:prstGeom prst="line">
@@ -12925,7 +13057,7 @@
         </p:nvCxnSpPr>
         <p:spPr>
           <a:xfrm>
-            <a:off x="1882775" y="1557338"/>
+            <a:off x="1876052" y="1906961"/>
             <a:ext cx="0" cy="4925443"/>
           </a:xfrm>
           <a:prstGeom prst="line">
@@ -12972,7 +13104,7 @@
         </p:nvCxnSpPr>
         <p:spPr>
           <a:xfrm>
-            <a:off x="6708775" y="1557336"/>
+            <a:off x="6702052" y="1906959"/>
             <a:ext cx="0" cy="4925443"/>
           </a:xfrm>
           <a:prstGeom prst="line">
@@ -13017,7 +13149,7 @@
         </p:nvSpPr>
         <p:spPr>
           <a:xfrm>
-            <a:off x="5471971" y="2651482"/>
+            <a:off x="5465248" y="3001105"/>
             <a:ext cx="94593" cy="479271"/>
           </a:xfrm>
           <a:prstGeom prst="rect">
@@ -13071,7 +13203,7 @@
         </p:nvSpPr>
         <p:spPr>
           <a:xfrm>
-            <a:off x="1830788" y="1847718"/>
+            <a:off x="1824065" y="2197341"/>
             <a:ext cx="85127" cy="2421715"/>
           </a:xfrm>
           <a:prstGeom prst="rect">
@@ -13125,7 +13257,7 @@
         </p:nvSpPr>
         <p:spPr>
           <a:xfrm>
-            <a:off x="1873351" y="1755184"/>
+            <a:off x="1866628" y="2104807"/>
             <a:ext cx="1234343" cy="200055"/>
           </a:xfrm>
           <a:prstGeom prst="rect">
@@ -13161,7 +13293,7 @@
         </p:nvSpPr>
         <p:spPr>
           <a:xfrm>
-            <a:off x="3108710" y="1871888"/>
+            <a:off x="3101987" y="2221511"/>
             <a:ext cx="3607905" cy="200055"/>
           </a:xfrm>
           <a:prstGeom prst="rect">
@@ -13202,7 +13334,7 @@
         </p:nvSpPr>
         <p:spPr>
           <a:xfrm>
-            <a:off x="1400350" y="908097"/>
+            <a:off x="1393627" y="1257720"/>
             <a:ext cx="964850" cy="649241"/>
           </a:xfrm>
           <a:prstGeom prst="rect">
@@ -13263,7 +13395,7 @@
         </p:nvSpPr>
         <p:spPr>
           <a:xfrm>
-            <a:off x="2657946" y="908094"/>
+            <a:off x="2651223" y="1257717"/>
             <a:ext cx="964850" cy="649241"/>
           </a:xfrm>
           <a:prstGeom prst="rect">
@@ -13324,7 +13456,7 @@
         </p:nvSpPr>
         <p:spPr>
           <a:xfrm>
-            <a:off x="3813350" y="908094"/>
+            <a:off x="3806627" y="1257717"/>
             <a:ext cx="964850" cy="649241"/>
           </a:xfrm>
           <a:prstGeom prst="rect">
@@ -13373,7 +13505,7 @@
         </p:nvSpPr>
         <p:spPr>
           <a:xfrm>
-            <a:off x="5020395" y="908094"/>
+            <a:off x="5013672" y="1257717"/>
             <a:ext cx="964850" cy="649241"/>
           </a:xfrm>
           <a:prstGeom prst="rect">
@@ -13422,7 +13554,7 @@
         </p:nvSpPr>
         <p:spPr>
           <a:xfrm>
-            <a:off x="6242811" y="908094"/>
+            <a:off x="6236088" y="1257717"/>
             <a:ext cx="964850" cy="649241"/>
           </a:xfrm>
           <a:prstGeom prst="rect">
@@ -13472,7 +13604,7 @@
         </p:nvSpPr>
         <p:spPr>
           <a:xfrm>
-            <a:off x="1873983" y="3836800"/>
+            <a:off x="1867260" y="4186423"/>
             <a:ext cx="1242756" cy="200055"/>
           </a:xfrm>
           <a:prstGeom prst="rect">
@@ -13510,7 +13642,7 @@
         </p:nvCxnSpPr>
         <p:spPr>
           <a:xfrm>
-            <a:off x="1922929" y="4040841"/>
+            <a:off x="1916206" y="4390464"/>
             <a:ext cx="1117119" cy="0"/>
           </a:xfrm>
           <a:prstGeom prst="straightConnector1">
@@ -13551,7 +13683,7 @@
         </p:nvSpPr>
         <p:spPr>
           <a:xfrm>
-            <a:off x="3110812" y="2142559"/>
+            <a:off x="3104089" y="2492182"/>
             <a:ext cx="3605803" cy="200055"/>
           </a:xfrm>
           <a:prstGeom prst="rect">
@@ -13590,7 +13722,7 @@
         </p:nvCxnSpPr>
         <p:spPr>
           <a:xfrm>
-            <a:off x="3151316" y="2320467"/>
+            <a:off x="3144593" y="2670090"/>
             <a:ext cx="3518763" cy="0"/>
           </a:xfrm>
           <a:prstGeom prst="straightConnector1">
@@ -13633,7 +13765,7 @@
         </p:nvCxnSpPr>
         <p:spPr>
           <a:xfrm>
-            <a:off x="1923392" y="1975132"/>
+            <a:off x="1916669" y="2324755"/>
             <a:ext cx="1133331" cy="0"/>
           </a:xfrm>
           <a:prstGeom prst="straightConnector1">
@@ -13673,7 +13805,7 @@
         </p:nvSpPr>
         <p:spPr>
           <a:xfrm>
-            <a:off x="6684934" y="3308375"/>
+            <a:off x="6678211" y="3657998"/>
             <a:ext cx="94593" cy="479271"/>
           </a:xfrm>
           <a:prstGeom prst="rect">
@@ -13729,7 +13861,7 @@
         </p:nvCxnSpPr>
         <p:spPr>
           <a:xfrm>
-            <a:off x="4345154" y="3018299"/>
+            <a:off x="4338431" y="3367922"/>
             <a:ext cx="1093228" cy="1639"/>
           </a:xfrm>
           <a:prstGeom prst="straightConnector1">
@@ -13770,7 +13902,7 @@
         </p:nvSpPr>
         <p:spPr>
           <a:xfrm>
-            <a:off x="3120370" y="3629244"/>
+            <a:off x="3113647" y="3978867"/>
             <a:ext cx="1210332" cy="200055"/>
           </a:xfrm>
           <a:prstGeom prst="rect">
@@ -13806,7 +13938,7 @@
         </p:nvSpPr>
         <p:spPr>
           <a:xfrm>
-            <a:off x="4305819" y="2535761"/>
+            <a:off x="4299096" y="2885384"/>
             <a:ext cx="1210582" cy="200055"/>
           </a:xfrm>
           <a:prstGeom prst="rect">
@@ -13842,7 +13974,7 @@
         </p:nvSpPr>
         <p:spPr>
           <a:xfrm>
-            <a:off x="3129599" y="2367039"/>
+            <a:off x="3122876" y="2716662"/>
             <a:ext cx="1248605" cy="200055"/>
           </a:xfrm>
           <a:prstGeom prst="rect">
@@ -13880,7 +14012,7 @@
         </p:nvCxnSpPr>
         <p:spPr>
           <a:xfrm>
-            <a:off x="3133380" y="3832315"/>
+            <a:off x="3126657" y="4181938"/>
             <a:ext cx="1164784" cy="0"/>
           </a:xfrm>
           <a:prstGeom prst="straightConnector1">
@@ -13975,7 +14107,7 @@
         </p:nvSpPr>
         <p:spPr>
           <a:xfrm>
-            <a:off x="4294014" y="2823565"/>
+            <a:off x="4287291" y="3173188"/>
             <a:ext cx="1181477" cy="200055"/>
           </a:xfrm>
           <a:prstGeom prst="rect">
@@ -14013,7 +14145,7 @@
         </p:nvCxnSpPr>
         <p:spPr>
           <a:xfrm>
-            <a:off x="4359823" y="3642035"/>
+            <a:off x="4353100" y="3991658"/>
             <a:ext cx="2317270" cy="3683"/>
           </a:xfrm>
           <a:prstGeom prst="straightConnector1">
@@ -14054,7 +14186,7 @@
         </p:nvSpPr>
         <p:spPr>
           <a:xfrm>
-            <a:off x="4299455" y="3450122"/>
+            <a:off x="4292732" y="3799745"/>
             <a:ext cx="2447189" cy="200055"/>
           </a:xfrm>
           <a:prstGeom prst="rect">
@@ -14090,7 +14222,7 @@
         </p:nvSpPr>
         <p:spPr>
           <a:xfrm>
-            <a:off x="6677920" y="1975132"/>
+            <a:off x="6671197" y="2324755"/>
             <a:ext cx="94593" cy="479271"/>
           </a:xfrm>
           <a:prstGeom prst="rect">
@@ -14144,7 +14276,7 @@
         </p:nvSpPr>
         <p:spPr>
           <a:xfrm>
-            <a:off x="3052282" y="1958990"/>
+            <a:off x="3045559" y="2308613"/>
             <a:ext cx="91307" cy="2174426"/>
           </a:xfrm>
           <a:prstGeom prst="rect">
@@ -14200,7 +14332,7 @@
         </p:nvCxnSpPr>
         <p:spPr>
           <a:xfrm>
-            <a:off x="3146349" y="2083043"/>
+            <a:off x="3139626" y="2432666"/>
             <a:ext cx="3523730" cy="0"/>
           </a:xfrm>
           <a:prstGeom prst="straightConnector1">
@@ -14240,7 +14372,7 @@
         </p:nvSpPr>
         <p:spPr>
           <a:xfrm>
-            <a:off x="4267811" y="2454403"/>
+            <a:off x="4261088" y="2804026"/>
             <a:ext cx="91306" cy="1567720"/>
           </a:xfrm>
           <a:prstGeom prst="rect">
@@ -14296,7 +14428,7 @@
         </p:nvCxnSpPr>
         <p:spPr>
           <a:xfrm>
-            <a:off x="3148649" y="2570471"/>
+            <a:off x="3141926" y="2920094"/>
             <a:ext cx="1119162" cy="0"/>
           </a:xfrm>
           <a:prstGeom prst="straightConnector1">
@@ -14336,7 +14468,7 @@
         </p:nvSpPr>
         <p:spPr>
           <a:xfrm>
-            <a:off x="4378204" y="3201959"/>
+            <a:off x="4371481" y="3551582"/>
             <a:ext cx="2337586" cy="200055"/>
           </a:xfrm>
           <a:prstGeom prst="rect">
@@ -14374,7 +14506,7 @@
         </p:nvCxnSpPr>
         <p:spPr>
           <a:xfrm>
-            <a:off x="4362466" y="3407033"/>
+            <a:off x="4355743" y="3756656"/>
             <a:ext cx="2314627" cy="0"/>
           </a:xfrm>
           <a:prstGeom prst="straightConnector1">
@@ -14416,7 +14548,7 @@
         </p:nvCxnSpPr>
         <p:spPr>
           <a:xfrm>
-            <a:off x="4352809" y="2742894"/>
+            <a:off x="4346086" y="3092517"/>
             <a:ext cx="1119162" cy="0"/>
           </a:xfrm>
           <a:prstGeom prst="straightConnector1">
@@ -14442,6 +14574,50 @@
           </a:fontRef>
         </p:style>
       </p:cxnSp>
+      <p:sp>
+        <p:nvSpPr>
+          <p:cNvPr id="39" name="TextBox 38">
+            <a:extLst>
+              <a:ext uri="{FF2B5EF4-FFF2-40B4-BE49-F238E27FC236}">
+                <a16:creationId xmlns:a16="http://schemas.microsoft.com/office/drawing/2014/main" id="{C31F72DD-6EB8-420F-86D9-E0F98958A8ED}"/>
+              </a:ext>
+            </a:extLst>
+          </p:cNvPr>
+          <p:cNvSpPr txBox="1"/>
+          <p:nvPr/>
+        </p:nvSpPr>
+        <p:spPr>
+          <a:xfrm>
+            <a:off x="1393627" y="719663"/>
+            <a:ext cx="3089307" cy="369332"/>
+          </a:xfrm>
+          <a:prstGeom prst="rect">
+            <a:avLst/>
+          </a:prstGeom>
+          <a:noFill/>
+        </p:spPr>
+        <p:txBody>
+          <a:bodyPr wrap="none" rtlCol="0">
+            <a:spAutoFit/>
+          </a:bodyPr>
+          <a:lstStyle/>
+          <a:p>
+            <a:r>
+              <a:rPr lang="en-IE" dirty="0">
+                <a:solidFill>
+                  <a:schemeClr val="accent4"/>
+                </a:solidFill>
+              </a:rPr>
+              <a:t>Standalone and Connected</a:t>
+            </a:r>
+            <a:endParaRPr lang="en-US" dirty="0">
+              <a:solidFill>
+                <a:schemeClr val="accent4"/>
+              </a:solidFill>
+            </a:endParaRPr>
+          </a:p>
+        </p:txBody>
+      </p:sp>
     </p:spTree>
     <p:extLst>
       <p:ext uri="{BB962C8B-B14F-4D97-AF65-F5344CB8AC3E}">
@@ -17814,7 +17990,7 @@
         </p:nvCxnSpPr>
         <p:spPr>
           <a:xfrm>
-            <a:off x="4295775" y="1557335"/>
+            <a:off x="5216898" y="1893512"/>
             <a:ext cx="0" cy="4925443"/>
           </a:xfrm>
           <a:prstGeom prst="line">
@@ -17861,7 +18037,7 @@
         </p:nvCxnSpPr>
         <p:spPr>
           <a:xfrm>
-            <a:off x="3108325" y="1557338"/>
+            <a:off x="4029448" y="1893515"/>
             <a:ext cx="0" cy="4925443"/>
           </a:xfrm>
           <a:prstGeom prst="line">
@@ -17908,7 +18084,7 @@
         </p:nvCxnSpPr>
         <p:spPr>
           <a:xfrm>
-            <a:off x="1882775" y="1557338"/>
+            <a:off x="2803898" y="1893515"/>
             <a:ext cx="0" cy="4925443"/>
           </a:xfrm>
           <a:prstGeom prst="line">
@@ -17955,7 +18131,7 @@
         </p:nvCxnSpPr>
         <p:spPr>
           <a:xfrm>
-            <a:off x="695325" y="1557338"/>
+            <a:off x="1616448" y="1893515"/>
             <a:ext cx="0" cy="4925443"/>
           </a:xfrm>
           <a:prstGeom prst="line">
@@ -18000,7 +18176,7 @@
         </p:nvSpPr>
         <p:spPr>
           <a:xfrm>
-            <a:off x="708684" y="3235665"/>
+            <a:off x="1629807" y="3571842"/>
             <a:ext cx="3598143" cy="200055"/>
           </a:xfrm>
           <a:prstGeom prst="rect">
@@ -18038,7 +18214,7 @@
         </p:nvCxnSpPr>
         <p:spPr>
           <a:xfrm>
-            <a:off x="715361" y="3406735"/>
+            <a:off x="1636484" y="3742912"/>
             <a:ext cx="3541412" cy="6838"/>
           </a:xfrm>
           <a:prstGeom prst="straightConnector1">
@@ -18078,7 +18254,7 @@
         </p:nvSpPr>
         <p:spPr>
           <a:xfrm>
-            <a:off x="1828799" y="1847719"/>
+            <a:off x="2749922" y="2183896"/>
             <a:ext cx="94593" cy="479271"/>
           </a:xfrm>
           <a:prstGeom prst="rect">
@@ -18132,7 +18308,7 @@
         </p:nvSpPr>
         <p:spPr>
           <a:xfrm>
-            <a:off x="3043446" y="2629773"/>
+            <a:off x="3964569" y="2965950"/>
             <a:ext cx="87734" cy="479271"/>
           </a:xfrm>
           <a:prstGeom prst="rect">
@@ -18186,7 +18362,7 @@
         </p:nvSpPr>
         <p:spPr>
           <a:xfrm>
-            <a:off x="4256773" y="3406735"/>
+            <a:off x="5177896" y="3742912"/>
             <a:ext cx="94593" cy="479271"/>
           </a:xfrm>
           <a:prstGeom prst="rect">
@@ -18240,7 +18416,7 @@
         </p:nvSpPr>
         <p:spPr>
           <a:xfrm>
-            <a:off x="695324" y="1669811"/>
+            <a:off x="1616447" y="2005988"/>
             <a:ext cx="1194128" cy="200055"/>
           </a:xfrm>
           <a:prstGeom prst="rect">
@@ -18276,7 +18452,7 @@
         </p:nvSpPr>
         <p:spPr>
           <a:xfrm>
-            <a:off x="1400350" y="908097"/>
+            <a:off x="2321473" y="1244274"/>
             <a:ext cx="964850" cy="649241"/>
           </a:xfrm>
           <a:prstGeom prst="rect">
@@ -18325,7 +18501,7 @@
         </p:nvSpPr>
         <p:spPr>
           <a:xfrm>
-            <a:off x="2657946" y="908094"/>
+            <a:off x="3579069" y="1244271"/>
             <a:ext cx="964850" cy="649241"/>
           </a:xfrm>
           <a:prstGeom prst="rect">
@@ -18374,7 +18550,7 @@
         </p:nvSpPr>
         <p:spPr>
           <a:xfrm>
-            <a:off x="3813350" y="908094"/>
+            <a:off x="4734473" y="1244271"/>
             <a:ext cx="964850" cy="649241"/>
           </a:xfrm>
           <a:prstGeom prst="rect">
@@ -18423,7 +18599,7 @@
         </p:nvGrpSpPr>
         <p:grpSpPr>
           <a:xfrm>
-            <a:off x="323132" y="901788"/>
+            <a:off x="1244255" y="1237965"/>
             <a:ext cx="744386" cy="655547"/>
             <a:chOff x="323132" y="901788"/>
             <a:chExt cx="744386" cy="655547"/>
@@ -18521,7 +18697,7 @@
         </p:nvCxnSpPr>
         <p:spPr>
           <a:xfrm>
-            <a:off x="695325" y="1847719"/>
+            <a:off x="1616448" y="2183896"/>
             <a:ext cx="1133474" cy="0"/>
           </a:xfrm>
           <a:prstGeom prst="straightConnector1">
@@ -18561,7 +18737,7 @@
         </p:nvSpPr>
         <p:spPr>
           <a:xfrm>
-            <a:off x="679615" y="2130057"/>
+            <a:off x="1600738" y="2466234"/>
             <a:ext cx="1180771" cy="200055"/>
           </a:xfrm>
           <a:prstGeom prst="rect">
@@ -18599,7 +18775,7 @@
         </p:nvCxnSpPr>
         <p:spPr>
           <a:xfrm>
-            <a:off x="700416" y="2336363"/>
+            <a:off x="1621539" y="2672540"/>
             <a:ext cx="1125897" cy="0"/>
           </a:xfrm>
           <a:prstGeom prst="straightConnector1">
@@ -18640,7 +18816,7 @@
         </p:nvSpPr>
         <p:spPr>
           <a:xfrm>
-            <a:off x="703074" y="3708413"/>
+            <a:off x="1624197" y="4044590"/>
             <a:ext cx="3592701" cy="200055"/>
           </a:xfrm>
           <a:prstGeom prst="rect">
@@ -18678,7 +18854,7 @@
         </p:nvCxnSpPr>
         <p:spPr>
           <a:xfrm>
-            <a:off x="700937" y="3886321"/>
+            <a:off x="1622060" y="4222498"/>
             <a:ext cx="3594839" cy="0"/>
           </a:xfrm>
           <a:prstGeom prst="straightConnector1">
@@ -18754,7 +18930,7 @@
         </p:nvSpPr>
         <p:spPr>
           <a:xfrm>
-            <a:off x="1824609" y="2642549"/>
+            <a:off x="2745732" y="2978726"/>
             <a:ext cx="94593" cy="479271"/>
           </a:xfrm>
           <a:prstGeom prst="rect">
@@ -18808,7 +18984,7 @@
         </p:nvSpPr>
         <p:spPr>
           <a:xfrm>
-            <a:off x="1835392" y="2376184"/>
+            <a:off x="2756515" y="2712361"/>
             <a:ext cx="1315924" cy="200055"/>
           </a:xfrm>
           <a:prstGeom prst="rect">
@@ -18844,7 +19020,7 @@
         </p:nvSpPr>
         <p:spPr>
           <a:xfrm>
-            <a:off x="1885262" y="2931138"/>
+            <a:off x="2806385" y="3267315"/>
             <a:ext cx="1180771" cy="200055"/>
           </a:xfrm>
           <a:prstGeom prst="rect">
@@ -18882,7 +19058,7 @@
         </p:nvCxnSpPr>
         <p:spPr>
           <a:xfrm>
-            <a:off x="1919202" y="3109046"/>
+            <a:off x="2840325" y="3445223"/>
             <a:ext cx="1133331" cy="0"/>
           </a:xfrm>
           <a:prstGeom prst="straightConnector1">
@@ -18925,7 +19101,7 @@
         </p:nvCxnSpPr>
         <p:spPr>
           <a:xfrm>
-            <a:off x="1919202" y="2642549"/>
+            <a:off x="2840325" y="2978726"/>
             <a:ext cx="1133331" cy="0"/>
           </a:xfrm>
           <a:prstGeom prst="straightConnector1">
@@ -18965,7 +19141,7 @@
         </p:nvSpPr>
         <p:spPr>
           <a:xfrm>
-            <a:off x="1809546" y="4325876"/>
+            <a:off x="2730669" y="4662053"/>
             <a:ext cx="94593" cy="479271"/>
           </a:xfrm>
           <a:prstGeom prst="rect">
@@ -19019,7 +19195,7 @@
         </p:nvSpPr>
         <p:spPr>
           <a:xfrm>
-            <a:off x="676071" y="4147968"/>
+            <a:off x="1597194" y="4484145"/>
             <a:ext cx="1194128" cy="200055"/>
           </a:xfrm>
           <a:prstGeom prst="rect">
@@ -19057,7 +19233,7 @@
         </p:nvCxnSpPr>
         <p:spPr>
           <a:xfrm>
-            <a:off x="676072" y="4325876"/>
+            <a:off x="1597195" y="4662053"/>
             <a:ext cx="1133474" cy="0"/>
           </a:xfrm>
           <a:prstGeom prst="straightConnector1">
@@ -19097,7 +19273,7 @@
         </p:nvSpPr>
         <p:spPr>
           <a:xfrm>
-            <a:off x="660362" y="4608214"/>
+            <a:off x="1581485" y="4944391"/>
             <a:ext cx="1180771" cy="200055"/>
           </a:xfrm>
           <a:prstGeom prst="rect">
@@ -19135,7 +19311,7 @@
         </p:nvCxnSpPr>
         <p:spPr>
           <a:xfrm>
-            <a:off x="681163" y="4814520"/>
+            <a:off x="1602286" y="5150697"/>
             <a:ext cx="1125897" cy="0"/>
           </a:xfrm>
           <a:prstGeom prst="straightConnector1">
@@ -19162,6 +19338,50 @@
           </a:fontRef>
         </p:style>
       </p:cxnSp>
+      <p:sp>
+        <p:nvSpPr>
+          <p:cNvPr id="34" name="TextBox 33">
+            <a:extLst>
+              <a:ext uri="{FF2B5EF4-FFF2-40B4-BE49-F238E27FC236}">
+                <a16:creationId xmlns:a16="http://schemas.microsoft.com/office/drawing/2014/main" id="{77B7D934-4AF8-446E-BC5E-263CC440AC37}"/>
+              </a:ext>
+            </a:extLst>
+          </p:cNvPr>
+          <p:cNvSpPr txBox="1"/>
+          <p:nvPr/>
+        </p:nvSpPr>
+        <p:spPr>
+          <a:xfrm>
+            <a:off x="1422173" y="759690"/>
+            <a:ext cx="3089307" cy="369332"/>
+          </a:xfrm>
+          <a:prstGeom prst="rect">
+            <a:avLst/>
+          </a:prstGeom>
+          <a:noFill/>
+        </p:spPr>
+        <p:txBody>
+          <a:bodyPr wrap="none" rtlCol="0">
+            <a:spAutoFit/>
+          </a:bodyPr>
+          <a:lstStyle/>
+          <a:p>
+            <a:r>
+              <a:rPr lang="en-IE" dirty="0">
+                <a:solidFill>
+                  <a:schemeClr val="accent4"/>
+                </a:solidFill>
+              </a:rPr>
+              <a:t>Standalone and Connected</a:t>
+            </a:r>
+            <a:endParaRPr lang="en-US" dirty="0">
+              <a:solidFill>
+                <a:schemeClr val="accent4"/>
+              </a:solidFill>
+            </a:endParaRPr>
+          </a:p>
+        </p:txBody>
+      </p:sp>
     </p:spTree>
     <p:extLst>
       <p:ext uri="{BB962C8B-B14F-4D97-AF65-F5344CB8AC3E}">
@@ -19208,7 +19428,7 @@
         </p:nvCxnSpPr>
         <p:spPr>
           <a:xfrm>
-            <a:off x="5519738" y="1557338"/>
+            <a:off x="5553356" y="1893514"/>
             <a:ext cx="0" cy="4925443"/>
           </a:xfrm>
           <a:prstGeom prst="line">
@@ -19255,7 +19475,7 @@
         </p:nvCxnSpPr>
         <p:spPr>
           <a:xfrm>
-            <a:off x="4295775" y="1557335"/>
+            <a:off x="4329393" y="1893511"/>
             <a:ext cx="0" cy="4925443"/>
           </a:xfrm>
           <a:prstGeom prst="line">
@@ -19302,7 +19522,7 @@
         </p:nvCxnSpPr>
         <p:spPr>
           <a:xfrm>
-            <a:off x="3108325" y="1557338"/>
+            <a:off x="3141943" y="1893514"/>
             <a:ext cx="0" cy="4925443"/>
           </a:xfrm>
           <a:prstGeom prst="line">
@@ -19349,7 +19569,7 @@
         </p:nvCxnSpPr>
         <p:spPr>
           <a:xfrm>
-            <a:off x="1882775" y="1557338"/>
+            <a:off x="1916393" y="1893514"/>
             <a:ext cx="0" cy="4925443"/>
           </a:xfrm>
           <a:prstGeom prst="line">
@@ -19396,7 +19616,7 @@
         </p:nvCxnSpPr>
         <p:spPr>
           <a:xfrm>
-            <a:off x="6708775" y="1557336"/>
+            <a:off x="6742393" y="1893512"/>
             <a:ext cx="0" cy="4925443"/>
           </a:xfrm>
           <a:prstGeom prst="line">
@@ -19441,7 +19661,7 @@
         </p:nvSpPr>
         <p:spPr>
           <a:xfrm>
-            <a:off x="3100871" y="3048641"/>
+            <a:off x="3134489" y="3384817"/>
             <a:ext cx="2374802" cy="200055"/>
           </a:xfrm>
           <a:prstGeom prst="rect">
@@ -19477,7 +19697,7 @@
         </p:nvSpPr>
         <p:spPr>
           <a:xfrm>
-            <a:off x="5472152" y="2876558"/>
+            <a:off x="5505770" y="3212734"/>
             <a:ext cx="94593" cy="479271"/>
           </a:xfrm>
           <a:prstGeom prst="rect">
@@ -19531,7 +19751,7 @@
         </p:nvSpPr>
         <p:spPr>
           <a:xfrm>
-            <a:off x="1830788" y="1847718"/>
+            <a:off x="1864406" y="2183894"/>
             <a:ext cx="85127" cy="2421715"/>
           </a:xfrm>
           <a:prstGeom prst="rect">
@@ -19585,7 +19805,7 @@
         </p:nvSpPr>
         <p:spPr>
           <a:xfrm>
-            <a:off x="1873351" y="1755184"/>
+            <a:off x="1906969" y="2091360"/>
             <a:ext cx="1234343" cy="200055"/>
           </a:xfrm>
           <a:prstGeom prst="rect">
@@ -19621,7 +19841,7 @@
         </p:nvSpPr>
         <p:spPr>
           <a:xfrm>
-            <a:off x="1873352" y="3679739"/>
+            <a:off x="1906970" y="4015915"/>
             <a:ext cx="4829368" cy="200055"/>
           </a:xfrm>
           <a:prstGeom prst="rect">
@@ -19673,7 +19893,7 @@
         </p:nvSpPr>
         <p:spPr>
           <a:xfrm>
-            <a:off x="1400350" y="908097"/>
+            <a:off x="1433968" y="1244273"/>
             <a:ext cx="964850" cy="649241"/>
           </a:xfrm>
           <a:prstGeom prst="rect">
@@ -19734,7 +19954,7 @@
         </p:nvSpPr>
         <p:spPr>
           <a:xfrm>
-            <a:off x="2657946" y="908094"/>
+            <a:off x="2691564" y="1244270"/>
             <a:ext cx="964850" cy="649241"/>
           </a:xfrm>
           <a:prstGeom prst="rect">
@@ -19787,7 +20007,7 @@
         </p:nvSpPr>
         <p:spPr>
           <a:xfrm>
-            <a:off x="3813350" y="908094"/>
+            <a:off x="3846968" y="1244270"/>
             <a:ext cx="964850" cy="649241"/>
           </a:xfrm>
           <a:prstGeom prst="rect">
@@ -19836,7 +20056,7 @@
         </p:nvSpPr>
         <p:spPr>
           <a:xfrm>
-            <a:off x="5020395" y="908094"/>
+            <a:off x="5054013" y="1244270"/>
             <a:ext cx="964850" cy="649241"/>
           </a:xfrm>
           <a:prstGeom prst="rect">
@@ -19885,7 +20105,7 @@
         </p:nvSpPr>
         <p:spPr>
           <a:xfrm>
-            <a:off x="6242811" y="908094"/>
+            <a:off x="6276429" y="1244270"/>
             <a:ext cx="964850" cy="649241"/>
           </a:xfrm>
           <a:prstGeom prst="rect">
@@ -19939,7 +20159,7 @@
         </p:nvSpPr>
         <p:spPr>
           <a:xfrm>
-            <a:off x="1873973" y="3222301"/>
+            <a:off x="1907591" y="3558477"/>
             <a:ext cx="1242756" cy="200055"/>
           </a:xfrm>
           <a:prstGeom prst="rect">
@@ -19977,7 +20197,7 @@
         </p:nvCxnSpPr>
         <p:spPr>
           <a:xfrm>
-            <a:off x="1922919" y="3426342"/>
+            <a:off x="1956537" y="3762518"/>
             <a:ext cx="1117119" cy="0"/>
           </a:xfrm>
           <a:prstGeom prst="straightConnector1">
@@ -20018,7 +20238,7 @@
         </p:nvSpPr>
         <p:spPr>
           <a:xfrm>
-            <a:off x="1873352" y="3950410"/>
+            <a:off x="1906970" y="4286586"/>
             <a:ext cx="4829368" cy="200055"/>
           </a:xfrm>
           <a:prstGeom prst="rect">
@@ -20056,7 +20276,7 @@
         </p:nvCxnSpPr>
         <p:spPr>
           <a:xfrm>
-            <a:off x="1915915" y="4128318"/>
+            <a:off x="1949533" y="4464494"/>
             <a:ext cx="4740268" cy="0"/>
           </a:xfrm>
           <a:prstGeom prst="straightConnector1">
@@ -20099,7 +20319,7 @@
         </p:nvCxnSpPr>
         <p:spPr>
           <a:xfrm>
-            <a:off x="1923392" y="1975132"/>
+            <a:off x="1957010" y="2311308"/>
             <a:ext cx="1133331" cy="0"/>
           </a:xfrm>
           <a:prstGeom prst="straightConnector1">
@@ -20141,7 +20361,7 @@
         </p:nvCxnSpPr>
         <p:spPr>
           <a:xfrm flipV="1">
-            <a:off x="3143476" y="3245014"/>
+            <a:off x="3177094" y="3581190"/>
             <a:ext cx="2295087" cy="13935"/>
           </a:xfrm>
           <a:prstGeom prst="straightConnector1">
@@ -20182,7 +20402,7 @@
         </p:nvSpPr>
         <p:spPr>
           <a:xfrm>
-            <a:off x="3100870" y="2760837"/>
+            <a:off x="3134488" y="3097013"/>
             <a:ext cx="2415712" cy="200055"/>
           </a:xfrm>
           <a:prstGeom prst="rect">
@@ -20272,7 +20492,7 @@
         </p:nvSpPr>
         <p:spPr>
           <a:xfrm>
-            <a:off x="6664024" y="3782983"/>
+            <a:off x="6697642" y="4119159"/>
             <a:ext cx="94593" cy="479271"/>
           </a:xfrm>
           <a:prstGeom prst="rect">
@@ -20326,7 +20546,7 @@
         </p:nvSpPr>
         <p:spPr>
           <a:xfrm>
-            <a:off x="3052283" y="1958990"/>
+            <a:off x="3085901" y="2295166"/>
             <a:ext cx="86970" cy="1639261"/>
           </a:xfrm>
           <a:prstGeom prst="rect">
@@ -20382,7 +20602,7 @@
         </p:nvCxnSpPr>
         <p:spPr>
           <a:xfrm>
-            <a:off x="1915915" y="3890894"/>
+            <a:off x="1949533" y="4227070"/>
             <a:ext cx="4740268" cy="0"/>
           </a:xfrm>
           <a:prstGeom prst="straightConnector1">
@@ -20424,7 +20644,7 @@
         </p:nvCxnSpPr>
         <p:spPr>
           <a:xfrm>
-            <a:off x="3142408" y="2960892"/>
+            <a:off x="3176026" y="3297068"/>
             <a:ext cx="2329744" cy="7078"/>
           </a:xfrm>
           <a:prstGeom prst="straightConnector1">
@@ -20464,7 +20684,7 @@
         </p:nvSpPr>
         <p:spPr>
           <a:xfrm>
-            <a:off x="4261570" y="2027262"/>
+            <a:off x="4295188" y="2363438"/>
             <a:ext cx="94593" cy="479271"/>
           </a:xfrm>
           <a:prstGeom prst="rect">
@@ -20520,7 +20740,7 @@
         </p:nvCxnSpPr>
         <p:spPr>
           <a:xfrm>
-            <a:off x="3134753" y="2394079"/>
+            <a:off x="3168371" y="2730255"/>
             <a:ext cx="1093228" cy="1639"/>
           </a:xfrm>
           <a:prstGeom prst="straightConnector1">
@@ -20561,7 +20781,7 @@
         </p:nvSpPr>
         <p:spPr>
           <a:xfrm>
-            <a:off x="3095418" y="1911541"/>
+            <a:off x="3129036" y="2247717"/>
             <a:ext cx="1210582" cy="200055"/>
           </a:xfrm>
           <a:prstGeom prst="rect">
@@ -20597,7 +20817,7 @@
         </p:nvSpPr>
         <p:spPr>
           <a:xfrm>
-            <a:off x="3083613" y="2199345"/>
+            <a:off x="3117231" y="2535521"/>
             <a:ext cx="1181477" cy="200055"/>
           </a:xfrm>
           <a:prstGeom prst="rect">
@@ -20635,7 +20855,7 @@
         </p:nvCxnSpPr>
         <p:spPr>
           <a:xfrm>
-            <a:off x="3142408" y="2118674"/>
+            <a:off x="3176026" y="2454850"/>
             <a:ext cx="1119162" cy="0"/>
           </a:xfrm>
           <a:prstGeom prst="straightConnector1">
@@ -20661,6 +20881,50 @@
           </a:fontRef>
         </p:style>
       </p:cxnSp>
+      <p:sp>
+        <p:nvSpPr>
+          <p:cNvPr id="34" name="TextBox 33">
+            <a:extLst>
+              <a:ext uri="{FF2B5EF4-FFF2-40B4-BE49-F238E27FC236}">
+                <a16:creationId xmlns:a16="http://schemas.microsoft.com/office/drawing/2014/main" id="{40A477A9-7352-44AB-BB61-A7A39139FF35}"/>
+              </a:ext>
+            </a:extLst>
+          </p:cNvPr>
+          <p:cNvSpPr txBox="1"/>
+          <p:nvPr/>
+        </p:nvSpPr>
+        <p:spPr>
+          <a:xfrm>
+            <a:off x="1433968" y="758545"/>
+            <a:ext cx="3089307" cy="369332"/>
+          </a:xfrm>
+          <a:prstGeom prst="rect">
+            <a:avLst/>
+          </a:prstGeom>
+          <a:noFill/>
+        </p:spPr>
+        <p:txBody>
+          <a:bodyPr wrap="none" rtlCol="0">
+            <a:spAutoFit/>
+          </a:bodyPr>
+          <a:lstStyle/>
+          <a:p>
+            <a:r>
+              <a:rPr lang="en-IE" dirty="0">
+                <a:solidFill>
+                  <a:schemeClr val="accent4"/>
+                </a:solidFill>
+              </a:rPr>
+              <a:t>Standalone and Connected</a:t>
+            </a:r>
+            <a:endParaRPr lang="en-US" dirty="0">
+              <a:solidFill>
+                <a:schemeClr val="accent4"/>
+              </a:solidFill>
+            </a:endParaRPr>
+          </a:p>
+        </p:txBody>
+      </p:sp>
     </p:spTree>
     <p:extLst>
       <p:ext uri="{BB962C8B-B14F-4D97-AF65-F5344CB8AC3E}">
@@ -20759,7 +21023,7 @@
         </p:nvSpPr>
         <p:spPr>
           <a:xfrm>
-            <a:off x="3604464" y="2279696"/>
+            <a:off x="3483441" y="3429000"/>
             <a:ext cx="964850" cy="649241"/>
           </a:xfrm>
           <a:prstGeom prst="rect">
@@ -20808,7 +21072,7 @@
         </p:nvSpPr>
         <p:spPr>
           <a:xfrm>
-            <a:off x="5218618" y="2279696"/>
+            <a:off x="5097595" y="3429000"/>
             <a:ext cx="964850" cy="649241"/>
           </a:xfrm>
           <a:prstGeom prst="rect">
@@ -20857,7 +21121,7 @@
         </p:nvSpPr>
         <p:spPr>
           <a:xfrm>
-            <a:off x="6832772" y="2279696"/>
+            <a:off x="6711749" y="3429000"/>
             <a:ext cx="964850" cy="649241"/>
           </a:xfrm>
           <a:prstGeom prst="rect">
@@ -20906,7 +21170,7 @@
         </p:nvSpPr>
         <p:spPr>
           <a:xfrm>
-            <a:off x="8446925" y="2279696"/>
+            <a:off x="8325902" y="3429000"/>
             <a:ext cx="964850" cy="649241"/>
           </a:xfrm>
           <a:prstGeom prst="rect">
@@ -20960,7 +21224,7 @@
         </p:nvCxnSpPr>
         <p:spPr>
           <a:xfrm>
-            <a:off x="4569314" y="2604317"/>
+            <a:off x="4448291" y="3753621"/>
             <a:ext cx="649304" cy="0"/>
           </a:xfrm>
           <a:prstGeom prst="straightConnector1">
@@ -21004,7 +21268,7 @@
         </p:nvCxnSpPr>
         <p:spPr>
           <a:xfrm>
-            <a:off x="6183468" y="2604317"/>
+            <a:off x="6062445" y="3753621"/>
             <a:ext cx="649304" cy="0"/>
           </a:xfrm>
           <a:prstGeom prst="straightConnector1">
@@ -21048,7 +21312,7 @@
         </p:nvCxnSpPr>
         <p:spPr>
           <a:xfrm>
-            <a:off x="7797622" y="2604317"/>
+            <a:off x="7676599" y="3753621"/>
             <a:ext cx="649303" cy="0"/>
           </a:xfrm>
           <a:prstGeom prst="straightConnector1">
@@ -21105,7 +21369,7 @@
         </p:blipFill>
         <p:spPr>
           <a:xfrm>
-            <a:off x="2033935" y="2085702"/>
+            <a:off x="1912912" y="3235006"/>
             <a:ext cx="1037230" cy="1037230"/>
           </a:xfrm>
           <a:prstGeom prst="rect">
@@ -21127,7 +21391,7 @@
         </p:nvSpPr>
         <p:spPr>
           <a:xfrm>
-            <a:off x="3001754" y="2474662"/>
+            <a:off x="2880731" y="3623966"/>
             <a:ext cx="602711" cy="259308"/>
           </a:xfrm>
           <a:prstGeom prst="rightArrow">
@@ -21181,7 +21445,7 @@
         </p:nvSpPr>
         <p:spPr>
           <a:xfrm>
-            <a:off x="2033935" y="2928936"/>
+            <a:off x="1912912" y="4078240"/>
             <a:ext cx="1037230" cy="200055"/>
           </a:xfrm>
           <a:prstGeom prst="rect">
@@ -21203,10 +21467,552 @@
           </a:p>
         </p:txBody>
       </p:sp>
+      <p:pic>
+        <p:nvPicPr>
+          <p:cNvPr id="15" name="Graphic 14" descr="Browser window with solid fill">
+            <a:extLst>
+              <a:ext uri="{FF2B5EF4-FFF2-40B4-BE49-F238E27FC236}">
+                <a16:creationId xmlns:a16="http://schemas.microsoft.com/office/drawing/2014/main" id="{C3F1D673-CBF5-47D3-809B-AD6877B451AD}"/>
+              </a:ext>
+            </a:extLst>
+          </p:cNvPr>
+          <p:cNvPicPr>
+            <a:picLocks noChangeAspect="1"/>
+          </p:cNvPicPr>
+          <p:nvPr/>
+        </p:nvPicPr>
+        <p:blipFill>
+          <a:blip r:embed="rId2">
+            <a:extLst>
+              <a:ext uri="{28A0092B-C50C-407E-A947-70E740481C1C}">
+                <a14:useLocalDpi xmlns:a14="http://schemas.microsoft.com/office/drawing/2010/main" val="0"/>
+              </a:ext>
+              <a:ext uri="{96DAC541-7B7A-43D3-8B79-37D633B846F1}">
+                <asvg:svgBlip xmlns:asvg="http://schemas.microsoft.com/office/drawing/2016/SVG/main" r:embed="rId3"/>
+              </a:ext>
+            </a:extLst>
+          </a:blip>
+          <a:stretch>
+            <a:fillRect/>
+          </a:stretch>
+        </p:blipFill>
+        <p:spPr>
+          <a:xfrm>
+            <a:off x="1912912" y="4444455"/>
+            <a:ext cx="1037230" cy="1037230"/>
+          </a:xfrm>
+          <a:prstGeom prst="rect">
+            <a:avLst/>
+          </a:prstGeom>
+        </p:spPr>
+      </p:pic>
+      <p:pic>
+        <p:nvPicPr>
+          <p:cNvPr id="16" name="Graphic 15" descr="Browser window with solid fill">
+            <a:extLst>
+              <a:ext uri="{FF2B5EF4-FFF2-40B4-BE49-F238E27FC236}">
+                <a16:creationId xmlns:a16="http://schemas.microsoft.com/office/drawing/2014/main" id="{7EEAC4BB-A4A7-4DCB-B1FA-86F373D54D99}"/>
+              </a:ext>
+            </a:extLst>
+          </p:cNvPr>
+          <p:cNvPicPr>
+            <a:picLocks noChangeAspect="1"/>
+          </p:cNvPicPr>
+          <p:nvPr/>
+        </p:nvPicPr>
+        <p:blipFill>
+          <a:blip r:embed="rId2">
+            <a:extLst>
+              <a:ext uri="{28A0092B-C50C-407E-A947-70E740481C1C}">
+                <a14:useLocalDpi xmlns:a14="http://schemas.microsoft.com/office/drawing/2010/main" val="0"/>
+              </a:ext>
+              <a:ext uri="{96DAC541-7B7A-43D3-8B79-37D633B846F1}">
+                <asvg:svgBlip xmlns:asvg="http://schemas.microsoft.com/office/drawing/2016/SVG/main" r:embed="rId3"/>
+              </a:ext>
+            </a:extLst>
+          </a:blip>
+          <a:stretch>
+            <a:fillRect/>
+          </a:stretch>
+        </p:blipFill>
+        <p:spPr>
+          <a:xfrm>
+            <a:off x="1912912" y="2086583"/>
+            <a:ext cx="1037230" cy="1037230"/>
+          </a:xfrm>
+          <a:prstGeom prst="rect">
+            <a:avLst/>
+          </a:prstGeom>
+        </p:spPr>
+      </p:pic>
+      <p:sp>
+        <p:nvSpPr>
+          <p:cNvPr id="17" name="Rectangle 16">
+            <a:extLst>
+              <a:ext uri="{FF2B5EF4-FFF2-40B4-BE49-F238E27FC236}">
+                <a16:creationId xmlns:a16="http://schemas.microsoft.com/office/drawing/2014/main" id="{9202CB4E-05B5-494E-807B-4AC243A31D98}"/>
+              </a:ext>
+            </a:extLst>
+          </p:cNvPr>
+          <p:cNvSpPr/>
+          <p:nvPr/>
+        </p:nvSpPr>
+        <p:spPr>
+          <a:xfrm>
+            <a:off x="3483441" y="2280577"/>
+            <a:ext cx="964850" cy="649241"/>
+          </a:xfrm>
+          <a:prstGeom prst="rect">
+            <a:avLst/>
+          </a:prstGeom>
+        </p:spPr>
+        <p:style>
+          <a:lnRef idx="2">
+            <a:schemeClr val="accent1">
+              <a:shade val="50000"/>
+            </a:schemeClr>
+          </a:lnRef>
+          <a:fillRef idx="1">
+            <a:schemeClr val="accent1"/>
+          </a:fillRef>
+          <a:effectRef idx="0">
+            <a:schemeClr val="accent1"/>
+          </a:effectRef>
+          <a:fontRef idx="minor">
+            <a:schemeClr val="lt1"/>
+          </a:fontRef>
+        </p:style>
+        <p:txBody>
+          <a:bodyPr rtlCol="0" anchor="ctr"/>
+          <a:lstStyle/>
+          <a:p>
+            <a:pPr algn="ctr"/>
+            <a:r>
+              <a:rPr lang="en-US" sz="1000" dirty="0"/>
+              <a:t>Load Balancer</a:t>
+            </a:r>
+          </a:p>
+        </p:txBody>
+      </p:sp>
+      <p:sp>
+        <p:nvSpPr>
+          <p:cNvPr id="18" name="Arrow: Right 17">
+            <a:extLst>
+              <a:ext uri="{FF2B5EF4-FFF2-40B4-BE49-F238E27FC236}">
+                <a16:creationId xmlns:a16="http://schemas.microsoft.com/office/drawing/2014/main" id="{166B363A-61EA-4A8F-B14E-FB9C73A49A21}"/>
+              </a:ext>
+            </a:extLst>
+          </p:cNvPr>
+          <p:cNvSpPr/>
+          <p:nvPr/>
+        </p:nvSpPr>
+        <p:spPr>
+          <a:xfrm>
+            <a:off x="2880730" y="2448898"/>
+            <a:ext cx="602711" cy="259308"/>
+          </a:xfrm>
+          <a:prstGeom prst="rightArrow">
+            <a:avLst/>
+          </a:prstGeom>
+          <a:solidFill>
+            <a:schemeClr val="bg1"/>
+          </a:solidFill>
+          <a:ln>
+            <a:solidFill>
+              <a:schemeClr val="accent1"/>
+            </a:solidFill>
+          </a:ln>
+        </p:spPr>
+        <p:style>
+          <a:lnRef idx="2">
+            <a:schemeClr val="accent1">
+              <a:shade val="50000"/>
+            </a:schemeClr>
+          </a:lnRef>
+          <a:fillRef idx="1">
+            <a:schemeClr val="accent1"/>
+          </a:fillRef>
+          <a:effectRef idx="0">
+            <a:schemeClr val="accent1"/>
+          </a:effectRef>
+          <a:fontRef idx="minor">
+            <a:schemeClr val="lt1"/>
+          </a:fontRef>
+        </p:style>
+        <p:txBody>
+          <a:bodyPr rtlCol="0" anchor="ctr"/>
+          <a:lstStyle/>
+          <a:p>
+            <a:pPr algn="ctr"/>
+            <a:endParaRPr lang="en-US"/>
+          </a:p>
+        </p:txBody>
+      </p:sp>
+      <p:sp>
+        <p:nvSpPr>
+          <p:cNvPr id="19" name="Arrow: Right 18">
+            <a:extLst>
+              <a:ext uri="{FF2B5EF4-FFF2-40B4-BE49-F238E27FC236}">
+                <a16:creationId xmlns:a16="http://schemas.microsoft.com/office/drawing/2014/main" id="{5191BB73-E7ED-4F4D-ABED-B3E6DC55A2B2}"/>
+              </a:ext>
+            </a:extLst>
+          </p:cNvPr>
+          <p:cNvSpPr/>
+          <p:nvPr/>
+        </p:nvSpPr>
+        <p:spPr>
+          <a:xfrm rot="18630752">
+            <a:off x="2735710" y="4491926"/>
+            <a:ext cx="1310161" cy="259308"/>
+          </a:xfrm>
+          <a:prstGeom prst="rightArrow">
+            <a:avLst>
+              <a:gd name="adj1" fmla="val 50000"/>
+              <a:gd name="adj2" fmla="val 54864"/>
+            </a:avLst>
+          </a:prstGeom>
+          <a:solidFill>
+            <a:schemeClr val="bg1"/>
+          </a:solidFill>
+          <a:ln>
+            <a:solidFill>
+              <a:schemeClr val="accent1"/>
+            </a:solidFill>
+          </a:ln>
+        </p:spPr>
+        <p:style>
+          <a:lnRef idx="2">
+            <a:schemeClr val="accent1">
+              <a:shade val="50000"/>
+            </a:schemeClr>
+          </a:lnRef>
+          <a:fillRef idx="1">
+            <a:schemeClr val="accent1"/>
+          </a:fillRef>
+          <a:effectRef idx="0">
+            <a:schemeClr val="accent1"/>
+          </a:effectRef>
+          <a:fontRef idx="minor">
+            <a:schemeClr val="lt1"/>
+          </a:fontRef>
+        </p:style>
+        <p:txBody>
+          <a:bodyPr rtlCol="0" anchor="ctr"/>
+          <a:lstStyle/>
+          <a:p>
+            <a:pPr algn="ctr"/>
+            <a:endParaRPr lang="en-US"/>
+          </a:p>
+        </p:txBody>
+      </p:sp>
+      <p:cxnSp>
+        <p:nvCxnSpPr>
+          <p:cNvPr id="23" name="Straight Arrow Connector 22">
+            <a:extLst>
+              <a:ext uri="{FF2B5EF4-FFF2-40B4-BE49-F238E27FC236}">
+                <a16:creationId xmlns:a16="http://schemas.microsoft.com/office/drawing/2014/main" id="{1D93F440-99CB-44B4-8A57-192448AE37C4}"/>
+              </a:ext>
+            </a:extLst>
+          </p:cNvPr>
+          <p:cNvCxnSpPr>
+            <a:cxnSpLocks/>
+            <a:stCxn id="17" idx="3"/>
+            <a:endCxn id="5" idx="1"/>
+          </p:cNvCxnSpPr>
+          <p:nvPr/>
+        </p:nvCxnSpPr>
+        <p:spPr>
+          <a:xfrm>
+            <a:off x="4448291" y="2605198"/>
+            <a:ext cx="649304" cy="1148423"/>
+          </a:xfrm>
+          <a:prstGeom prst="straightConnector1">
+            <a:avLst/>
+          </a:prstGeom>
+          <a:ln>
+            <a:headEnd type="none"/>
+            <a:tailEnd type="triangle"/>
+          </a:ln>
+        </p:spPr>
+        <p:style>
+          <a:lnRef idx="3">
+            <a:schemeClr val="accent1"/>
+          </a:lnRef>
+          <a:fillRef idx="0">
+            <a:schemeClr val="accent1"/>
+          </a:fillRef>
+          <a:effectRef idx="2">
+            <a:schemeClr val="accent1"/>
+          </a:effectRef>
+          <a:fontRef idx="minor">
+            <a:schemeClr val="tx1"/>
+          </a:fontRef>
+        </p:style>
+      </p:cxnSp>
+      <p:sp>
+        <p:nvSpPr>
+          <p:cNvPr id="24" name="Rectangle 23">
+            <a:extLst>
+              <a:ext uri="{FF2B5EF4-FFF2-40B4-BE49-F238E27FC236}">
+                <a16:creationId xmlns:a16="http://schemas.microsoft.com/office/drawing/2014/main" id="{B3BB7DA8-700C-4525-A8DD-6F72BF778B4B}"/>
+              </a:ext>
+            </a:extLst>
+          </p:cNvPr>
+          <p:cNvSpPr/>
+          <p:nvPr/>
+        </p:nvSpPr>
+        <p:spPr>
+          <a:xfrm>
+            <a:off x="8325902" y="4638449"/>
+            <a:ext cx="964850" cy="649241"/>
+          </a:xfrm>
+          <a:prstGeom prst="rect">
+            <a:avLst/>
+          </a:prstGeom>
+        </p:spPr>
+        <p:style>
+          <a:lnRef idx="2">
+            <a:schemeClr val="accent1">
+              <a:shade val="50000"/>
+            </a:schemeClr>
+          </a:lnRef>
+          <a:fillRef idx="1">
+            <a:schemeClr val="accent1"/>
+          </a:fillRef>
+          <a:effectRef idx="0">
+            <a:schemeClr val="accent1"/>
+          </a:effectRef>
+          <a:fontRef idx="minor">
+            <a:schemeClr val="lt1"/>
+          </a:fontRef>
+        </p:style>
+        <p:txBody>
+          <a:bodyPr rtlCol="0" anchor="ctr"/>
+          <a:lstStyle/>
+          <a:p>
+            <a:pPr algn="ctr"/>
+            <a:r>
+              <a:rPr lang="en-IE" sz="1000" dirty="0"/>
+              <a:t>Mendix App Pod</a:t>
+            </a:r>
+            <a:endParaRPr lang="en-US" sz="1000" dirty="0"/>
+          </a:p>
+        </p:txBody>
+      </p:sp>
+      <p:sp>
+        <p:nvSpPr>
+          <p:cNvPr id="25" name="Rectangle 24">
+            <a:extLst>
+              <a:ext uri="{FF2B5EF4-FFF2-40B4-BE49-F238E27FC236}">
+                <a16:creationId xmlns:a16="http://schemas.microsoft.com/office/drawing/2014/main" id="{892465C8-D68A-43CB-A039-7448B6629ABF}"/>
+              </a:ext>
+            </a:extLst>
+          </p:cNvPr>
+          <p:cNvSpPr/>
+          <p:nvPr/>
+        </p:nvSpPr>
+        <p:spPr>
+          <a:xfrm>
+            <a:off x="8325902" y="2274650"/>
+            <a:ext cx="964850" cy="649241"/>
+          </a:xfrm>
+          <a:prstGeom prst="rect">
+            <a:avLst/>
+          </a:prstGeom>
+        </p:spPr>
+        <p:style>
+          <a:lnRef idx="2">
+            <a:schemeClr val="accent1">
+              <a:shade val="50000"/>
+            </a:schemeClr>
+          </a:lnRef>
+          <a:fillRef idx="1">
+            <a:schemeClr val="accent1"/>
+          </a:fillRef>
+          <a:effectRef idx="0">
+            <a:schemeClr val="accent1"/>
+          </a:effectRef>
+          <a:fontRef idx="minor">
+            <a:schemeClr val="lt1"/>
+          </a:fontRef>
+        </p:style>
+        <p:txBody>
+          <a:bodyPr rtlCol="0" anchor="ctr"/>
+          <a:lstStyle/>
+          <a:p>
+            <a:pPr algn="ctr"/>
+            <a:r>
+              <a:rPr lang="en-IE" sz="1000" dirty="0"/>
+              <a:t>Mendix App Pod</a:t>
+            </a:r>
+            <a:endParaRPr lang="en-US" sz="1000" dirty="0"/>
+          </a:p>
+        </p:txBody>
+      </p:sp>
+      <p:cxnSp>
+        <p:nvCxnSpPr>
+          <p:cNvPr id="27" name="Straight Arrow Connector 26">
+            <a:extLst>
+              <a:ext uri="{FF2B5EF4-FFF2-40B4-BE49-F238E27FC236}">
+                <a16:creationId xmlns:a16="http://schemas.microsoft.com/office/drawing/2014/main" id="{23206046-042D-49C4-86CA-9178935B1DE8}"/>
+              </a:ext>
+            </a:extLst>
+          </p:cNvPr>
+          <p:cNvCxnSpPr>
+            <a:cxnSpLocks/>
+            <a:stCxn id="6" idx="3"/>
+            <a:endCxn id="25" idx="1"/>
+          </p:cNvCxnSpPr>
+          <p:nvPr/>
+        </p:nvCxnSpPr>
+        <p:spPr>
+          <a:xfrm flipV="1">
+            <a:off x="7676599" y="2599271"/>
+            <a:ext cx="649303" cy="1154350"/>
+          </a:xfrm>
+          <a:prstGeom prst="straightConnector1">
+            <a:avLst/>
+          </a:prstGeom>
+          <a:ln>
+            <a:headEnd type="none"/>
+            <a:tailEnd type="triangle"/>
+          </a:ln>
+        </p:spPr>
+        <p:style>
+          <a:lnRef idx="3">
+            <a:schemeClr val="accent1"/>
+          </a:lnRef>
+          <a:fillRef idx="0">
+            <a:schemeClr val="accent1"/>
+          </a:fillRef>
+          <a:effectRef idx="2">
+            <a:schemeClr val="accent1"/>
+          </a:effectRef>
+          <a:fontRef idx="minor">
+            <a:schemeClr val="tx1"/>
+          </a:fontRef>
+        </p:style>
+      </p:cxnSp>
+      <p:cxnSp>
+        <p:nvCxnSpPr>
+          <p:cNvPr id="28" name="Straight Arrow Connector 27">
+            <a:extLst>
+              <a:ext uri="{FF2B5EF4-FFF2-40B4-BE49-F238E27FC236}">
+                <a16:creationId xmlns:a16="http://schemas.microsoft.com/office/drawing/2014/main" id="{857C2C73-131F-4CF4-9F68-8D81D3A5ECC9}"/>
+              </a:ext>
+            </a:extLst>
+          </p:cNvPr>
+          <p:cNvCxnSpPr>
+            <a:cxnSpLocks/>
+            <a:stCxn id="6" idx="3"/>
+            <a:endCxn id="24" idx="1"/>
+          </p:cNvCxnSpPr>
+          <p:nvPr/>
+        </p:nvCxnSpPr>
+        <p:spPr>
+          <a:xfrm>
+            <a:off x="7676599" y="3753621"/>
+            <a:ext cx="649303" cy="1209449"/>
+          </a:xfrm>
+          <a:prstGeom prst="straightConnector1">
+            <a:avLst/>
+          </a:prstGeom>
+          <a:ln>
+            <a:headEnd type="none"/>
+            <a:tailEnd type="triangle"/>
+          </a:ln>
+        </p:spPr>
+        <p:style>
+          <a:lnRef idx="3">
+            <a:schemeClr val="accent1"/>
+          </a:lnRef>
+          <a:fillRef idx="0">
+            <a:schemeClr val="accent1"/>
+          </a:fillRef>
+          <a:effectRef idx="2">
+            <a:schemeClr val="accent1"/>
+          </a:effectRef>
+          <a:fontRef idx="minor">
+            <a:schemeClr val="tx1"/>
+          </a:fontRef>
+        </p:style>
+      </p:cxnSp>
+      <p:sp>
+        <p:nvSpPr>
+          <p:cNvPr id="26" name="TextBox 25">
+            <a:extLst>
+              <a:ext uri="{FF2B5EF4-FFF2-40B4-BE49-F238E27FC236}">
+                <a16:creationId xmlns:a16="http://schemas.microsoft.com/office/drawing/2014/main" id="{BD1E809B-0AB4-4A35-9914-9F41EF933683}"/>
+              </a:ext>
+            </a:extLst>
+          </p:cNvPr>
+          <p:cNvSpPr txBox="1"/>
+          <p:nvPr/>
+        </p:nvSpPr>
+        <p:spPr>
+          <a:xfrm>
+            <a:off x="1912912" y="2926787"/>
+            <a:ext cx="1037230" cy="200055"/>
+          </a:xfrm>
+          <a:prstGeom prst="rect">
+            <a:avLst/>
+          </a:prstGeom>
+          <a:noFill/>
+        </p:spPr>
+        <p:txBody>
+          <a:bodyPr wrap="square" rtlCol="0">
+            <a:spAutoFit/>
+          </a:bodyPr>
+          <a:lstStyle/>
+          <a:p>
+            <a:pPr algn="ctr"/>
+            <a:r>
+              <a:rPr lang="en-US" sz="700" dirty="0"/>
+              <a:t>Web Browser</a:t>
+            </a:r>
+          </a:p>
+        </p:txBody>
+      </p:sp>
+      <p:sp>
+        <p:nvSpPr>
+          <p:cNvPr id="29" name="TextBox 28">
+            <a:extLst>
+              <a:ext uri="{FF2B5EF4-FFF2-40B4-BE49-F238E27FC236}">
+                <a16:creationId xmlns:a16="http://schemas.microsoft.com/office/drawing/2014/main" id="{5B07D298-D32C-4748-9467-268D25726659}"/>
+              </a:ext>
+            </a:extLst>
+          </p:cNvPr>
+          <p:cNvSpPr txBox="1"/>
+          <p:nvPr/>
+        </p:nvSpPr>
+        <p:spPr>
+          <a:xfrm>
+            <a:off x="1912912" y="5281630"/>
+            <a:ext cx="1037230" cy="200055"/>
+          </a:xfrm>
+          <a:prstGeom prst="rect">
+            <a:avLst/>
+          </a:prstGeom>
+          <a:noFill/>
+        </p:spPr>
+        <p:txBody>
+          <a:bodyPr wrap="square" rtlCol="0">
+            <a:spAutoFit/>
+          </a:bodyPr>
+          <a:lstStyle/>
+          <a:p>
+            <a:pPr algn="ctr"/>
+            <a:r>
+              <a:rPr lang="en-US" sz="700" dirty="0"/>
+              <a:t>Web Browser</a:t>
+            </a:r>
+          </a:p>
+        </p:txBody>
+      </p:sp>
     </p:spTree>
     <p:extLst>
       <p:ext uri="{BB962C8B-B14F-4D97-AF65-F5344CB8AC3E}">
-        <p14:creationId xmlns:p14="http://schemas.microsoft.com/office/powerpoint/2010/main" val="2401413401"/>
+        <p14:creationId xmlns:p14="http://schemas.microsoft.com/office/powerpoint/2010/main" val="844551964"/>
       </p:ext>
     </p:extLst>
   </p:cSld>
@@ -21301,7 +22107,7 @@
         </p:nvSpPr>
         <p:spPr>
           <a:xfrm>
-            <a:off x="3604464" y="2279696"/>
+            <a:off x="3483441" y="3429000"/>
             <a:ext cx="964850" cy="649241"/>
           </a:xfrm>
           <a:prstGeom prst="rect">
@@ -21350,7 +22156,7 @@
         </p:nvSpPr>
         <p:spPr>
           <a:xfrm>
-            <a:off x="5218618" y="2279696"/>
+            <a:off x="5097595" y="3434927"/>
             <a:ext cx="964850" cy="649241"/>
           </a:xfrm>
           <a:prstGeom prst="rect">
@@ -21399,7 +22205,7 @@
         </p:nvSpPr>
         <p:spPr>
           <a:xfrm>
-            <a:off x="6832771" y="2279696"/>
+            <a:off x="6711748" y="3434927"/>
             <a:ext cx="964850" cy="649241"/>
           </a:xfrm>
           <a:prstGeom prst="rect">
@@ -21453,8 +22259,8 @@
         </p:nvCxnSpPr>
         <p:spPr>
           <a:xfrm>
-            <a:off x="4569314" y="2604317"/>
-            <a:ext cx="649304" cy="0"/>
+            <a:off x="4448291" y="3753621"/>
+            <a:ext cx="649304" cy="5927"/>
           </a:xfrm>
           <a:prstGeom prst="straightConnector1">
             <a:avLst/>
@@ -21497,7 +22303,7 @@
         </p:nvCxnSpPr>
         <p:spPr>
           <a:xfrm>
-            <a:off x="6183468" y="2604317"/>
+            <a:off x="6062445" y="3759548"/>
             <a:ext cx="649303" cy="0"/>
           </a:xfrm>
           <a:prstGeom prst="straightConnector1">
@@ -21554,7 +22360,7 @@
         </p:blipFill>
         <p:spPr>
           <a:xfrm>
-            <a:off x="2033935" y="2085702"/>
+            <a:off x="1891060" y="3235006"/>
             <a:ext cx="1037230" cy="1037230"/>
           </a:xfrm>
           <a:prstGeom prst="rect">
@@ -21576,8 +22382,8 @@
         </p:nvSpPr>
         <p:spPr>
           <a:xfrm>
-            <a:off x="3005419" y="2474662"/>
-            <a:ext cx="599046" cy="259308"/>
+            <a:off x="2880731" y="3623966"/>
+            <a:ext cx="602711" cy="259308"/>
           </a:xfrm>
           <a:prstGeom prst="rightArrow">
             <a:avLst/>
@@ -21630,7 +22436,7 @@
         </p:nvSpPr>
         <p:spPr>
           <a:xfrm>
-            <a:off x="2033935" y="2928936"/>
+            <a:off x="1891060" y="4078240"/>
             <a:ext cx="1037230" cy="200055"/>
           </a:xfrm>
           <a:prstGeom prst="rect">
@@ -21652,10 +22458,705 @@
           </a:p>
         </p:txBody>
       </p:sp>
+      <p:pic>
+        <p:nvPicPr>
+          <p:cNvPr id="15" name="Graphic 14" descr="Browser window with solid fill">
+            <a:extLst>
+              <a:ext uri="{FF2B5EF4-FFF2-40B4-BE49-F238E27FC236}">
+                <a16:creationId xmlns:a16="http://schemas.microsoft.com/office/drawing/2014/main" id="{C3F1D673-CBF5-47D3-809B-AD6877B451AD}"/>
+              </a:ext>
+            </a:extLst>
+          </p:cNvPr>
+          <p:cNvPicPr>
+            <a:picLocks noChangeAspect="1"/>
+          </p:cNvPicPr>
+          <p:nvPr/>
+        </p:nvPicPr>
+        <p:blipFill>
+          <a:blip r:embed="rId2">
+            <a:extLst>
+              <a:ext uri="{28A0092B-C50C-407E-A947-70E740481C1C}">
+                <a14:useLocalDpi xmlns:a14="http://schemas.microsoft.com/office/drawing/2010/main" val="0"/>
+              </a:ext>
+              <a:ext uri="{96DAC541-7B7A-43D3-8B79-37D633B846F1}">
+                <asvg:svgBlip xmlns:asvg="http://schemas.microsoft.com/office/drawing/2016/SVG/main" r:embed="rId3"/>
+              </a:ext>
+            </a:extLst>
+          </a:blip>
+          <a:stretch>
+            <a:fillRect/>
+          </a:stretch>
+        </p:blipFill>
+        <p:spPr>
+          <a:xfrm>
+            <a:off x="1891060" y="4444455"/>
+            <a:ext cx="1037230" cy="1037230"/>
+          </a:xfrm>
+          <a:prstGeom prst="rect">
+            <a:avLst/>
+          </a:prstGeom>
+        </p:spPr>
+      </p:pic>
+      <p:pic>
+        <p:nvPicPr>
+          <p:cNvPr id="16" name="Graphic 15" descr="Browser window with solid fill">
+            <a:extLst>
+              <a:ext uri="{FF2B5EF4-FFF2-40B4-BE49-F238E27FC236}">
+                <a16:creationId xmlns:a16="http://schemas.microsoft.com/office/drawing/2014/main" id="{7EEAC4BB-A4A7-4DCB-B1FA-86F373D54D99}"/>
+              </a:ext>
+            </a:extLst>
+          </p:cNvPr>
+          <p:cNvPicPr>
+            <a:picLocks noChangeAspect="1"/>
+          </p:cNvPicPr>
+          <p:nvPr/>
+        </p:nvPicPr>
+        <p:blipFill>
+          <a:blip r:embed="rId2">
+            <a:extLst>
+              <a:ext uri="{28A0092B-C50C-407E-A947-70E740481C1C}">
+                <a14:useLocalDpi xmlns:a14="http://schemas.microsoft.com/office/drawing/2010/main" val="0"/>
+              </a:ext>
+              <a:ext uri="{96DAC541-7B7A-43D3-8B79-37D633B846F1}">
+                <asvg:svgBlip xmlns:asvg="http://schemas.microsoft.com/office/drawing/2016/SVG/main" r:embed="rId3"/>
+              </a:ext>
+            </a:extLst>
+          </a:blip>
+          <a:stretch>
+            <a:fillRect/>
+          </a:stretch>
+        </p:blipFill>
+        <p:spPr>
+          <a:xfrm>
+            <a:off x="1891060" y="2086583"/>
+            <a:ext cx="1037230" cy="1037230"/>
+          </a:xfrm>
+          <a:prstGeom prst="rect">
+            <a:avLst/>
+          </a:prstGeom>
+        </p:spPr>
+      </p:pic>
+      <p:sp>
+        <p:nvSpPr>
+          <p:cNvPr id="17" name="Rectangle 16">
+            <a:extLst>
+              <a:ext uri="{FF2B5EF4-FFF2-40B4-BE49-F238E27FC236}">
+                <a16:creationId xmlns:a16="http://schemas.microsoft.com/office/drawing/2014/main" id="{9202CB4E-05B5-494E-807B-4AC243A31D98}"/>
+              </a:ext>
+            </a:extLst>
+          </p:cNvPr>
+          <p:cNvSpPr/>
+          <p:nvPr/>
+        </p:nvSpPr>
+        <p:spPr>
+          <a:xfrm>
+            <a:off x="3483441" y="2280577"/>
+            <a:ext cx="964850" cy="649241"/>
+          </a:xfrm>
+          <a:prstGeom prst="rect">
+            <a:avLst/>
+          </a:prstGeom>
+        </p:spPr>
+        <p:style>
+          <a:lnRef idx="2">
+            <a:schemeClr val="accent1">
+              <a:shade val="50000"/>
+            </a:schemeClr>
+          </a:lnRef>
+          <a:fillRef idx="1">
+            <a:schemeClr val="accent1"/>
+          </a:fillRef>
+          <a:effectRef idx="0">
+            <a:schemeClr val="accent1"/>
+          </a:effectRef>
+          <a:fontRef idx="minor">
+            <a:schemeClr val="lt1"/>
+          </a:fontRef>
+        </p:style>
+        <p:txBody>
+          <a:bodyPr rtlCol="0" anchor="ctr"/>
+          <a:lstStyle/>
+          <a:p>
+            <a:pPr algn="ctr"/>
+            <a:r>
+              <a:rPr lang="en-US" sz="1000" dirty="0"/>
+              <a:t>Load Balancer</a:t>
+            </a:r>
+          </a:p>
+        </p:txBody>
+      </p:sp>
+      <p:sp>
+        <p:nvSpPr>
+          <p:cNvPr id="18" name="Arrow: Right 17">
+            <a:extLst>
+              <a:ext uri="{FF2B5EF4-FFF2-40B4-BE49-F238E27FC236}">
+                <a16:creationId xmlns:a16="http://schemas.microsoft.com/office/drawing/2014/main" id="{166B363A-61EA-4A8F-B14E-FB9C73A49A21}"/>
+              </a:ext>
+            </a:extLst>
+          </p:cNvPr>
+          <p:cNvSpPr/>
+          <p:nvPr/>
+        </p:nvSpPr>
+        <p:spPr>
+          <a:xfrm>
+            <a:off x="2880730" y="2448898"/>
+            <a:ext cx="602711" cy="259308"/>
+          </a:xfrm>
+          <a:prstGeom prst="rightArrow">
+            <a:avLst/>
+          </a:prstGeom>
+          <a:solidFill>
+            <a:schemeClr val="bg1"/>
+          </a:solidFill>
+          <a:ln>
+            <a:solidFill>
+              <a:schemeClr val="accent1"/>
+            </a:solidFill>
+          </a:ln>
+        </p:spPr>
+        <p:style>
+          <a:lnRef idx="2">
+            <a:schemeClr val="accent1">
+              <a:shade val="50000"/>
+            </a:schemeClr>
+          </a:lnRef>
+          <a:fillRef idx="1">
+            <a:schemeClr val="accent1"/>
+          </a:fillRef>
+          <a:effectRef idx="0">
+            <a:schemeClr val="accent1"/>
+          </a:effectRef>
+          <a:fontRef idx="minor">
+            <a:schemeClr val="lt1"/>
+          </a:fontRef>
+        </p:style>
+        <p:txBody>
+          <a:bodyPr rtlCol="0" anchor="ctr"/>
+          <a:lstStyle/>
+          <a:p>
+            <a:pPr algn="ctr"/>
+            <a:endParaRPr lang="en-US"/>
+          </a:p>
+        </p:txBody>
+      </p:sp>
+      <p:sp>
+        <p:nvSpPr>
+          <p:cNvPr id="19" name="Arrow: Right 18">
+            <a:extLst>
+              <a:ext uri="{FF2B5EF4-FFF2-40B4-BE49-F238E27FC236}">
+                <a16:creationId xmlns:a16="http://schemas.microsoft.com/office/drawing/2014/main" id="{5191BB73-E7ED-4F4D-ABED-B3E6DC55A2B2}"/>
+              </a:ext>
+            </a:extLst>
+          </p:cNvPr>
+          <p:cNvSpPr/>
+          <p:nvPr/>
+        </p:nvSpPr>
+        <p:spPr>
+          <a:xfrm rot="18630752">
+            <a:off x="2735710" y="4491926"/>
+            <a:ext cx="1310161" cy="259308"/>
+          </a:xfrm>
+          <a:prstGeom prst="rightArrow">
+            <a:avLst>
+              <a:gd name="adj1" fmla="val 50000"/>
+              <a:gd name="adj2" fmla="val 54864"/>
+            </a:avLst>
+          </a:prstGeom>
+          <a:solidFill>
+            <a:schemeClr val="bg1"/>
+          </a:solidFill>
+          <a:ln>
+            <a:solidFill>
+              <a:schemeClr val="accent1"/>
+            </a:solidFill>
+          </a:ln>
+        </p:spPr>
+        <p:style>
+          <a:lnRef idx="2">
+            <a:schemeClr val="accent1">
+              <a:shade val="50000"/>
+            </a:schemeClr>
+          </a:lnRef>
+          <a:fillRef idx="1">
+            <a:schemeClr val="accent1"/>
+          </a:fillRef>
+          <a:effectRef idx="0">
+            <a:schemeClr val="accent1"/>
+          </a:effectRef>
+          <a:fontRef idx="minor">
+            <a:schemeClr val="lt1"/>
+          </a:fontRef>
+        </p:style>
+        <p:txBody>
+          <a:bodyPr rtlCol="0" anchor="ctr"/>
+          <a:lstStyle/>
+          <a:p>
+            <a:pPr algn="ctr"/>
+            <a:endParaRPr lang="en-US"/>
+          </a:p>
+        </p:txBody>
+      </p:sp>
+      <p:cxnSp>
+        <p:nvCxnSpPr>
+          <p:cNvPr id="23" name="Straight Arrow Connector 22">
+            <a:extLst>
+              <a:ext uri="{FF2B5EF4-FFF2-40B4-BE49-F238E27FC236}">
+                <a16:creationId xmlns:a16="http://schemas.microsoft.com/office/drawing/2014/main" id="{1D93F440-99CB-44B4-8A57-192448AE37C4}"/>
+              </a:ext>
+            </a:extLst>
+          </p:cNvPr>
+          <p:cNvCxnSpPr>
+            <a:cxnSpLocks/>
+            <a:stCxn id="17" idx="3"/>
+            <a:endCxn id="6" idx="1"/>
+          </p:cNvCxnSpPr>
+          <p:nvPr/>
+        </p:nvCxnSpPr>
+        <p:spPr>
+          <a:xfrm>
+            <a:off x="4448291" y="2605198"/>
+            <a:ext cx="649304" cy="1154350"/>
+          </a:xfrm>
+          <a:prstGeom prst="straightConnector1">
+            <a:avLst/>
+          </a:prstGeom>
+          <a:ln>
+            <a:headEnd type="none"/>
+            <a:tailEnd type="triangle"/>
+          </a:ln>
+        </p:spPr>
+        <p:style>
+          <a:lnRef idx="3">
+            <a:schemeClr val="accent1"/>
+          </a:lnRef>
+          <a:fillRef idx="0">
+            <a:schemeClr val="accent1"/>
+          </a:fillRef>
+          <a:effectRef idx="2">
+            <a:schemeClr val="accent1"/>
+          </a:effectRef>
+          <a:fontRef idx="minor">
+            <a:schemeClr val="tx1"/>
+          </a:fontRef>
+        </p:style>
+      </p:cxnSp>
+      <p:sp>
+        <p:nvSpPr>
+          <p:cNvPr id="24" name="Rectangle 23">
+            <a:extLst>
+              <a:ext uri="{FF2B5EF4-FFF2-40B4-BE49-F238E27FC236}">
+                <a16:creationId xmlns:a16="http://schemas.microsoft.com/office/drawing/2014/main" id="{B3BB7DA8-700C-4525-A8DD-6F72BF778B4B}"/>
+              </a:ext>
+            </a:extLst>
+          </p:cNvPr>
+          <p:cNvSpPr/>
+          <p:nvPr/>
+        </p:nvSpPr>
+        <p:spPr>
+          <a:xfrm>
+            <a:off x="6711748" y="4644376"/>
+            <a:ext cx="964850" cy="649241"/>
+          </a:xfrm>
+          <a:prstGeom prst="rect">
+            <a:avLst/>
+          </a:prstGeom>
+        </p:spPr>
+        <p:style>
+          <a:lnRef idx="2">
+            <a:schemeClr val="accent1">
+              <a:shade val="50000"/>
+            </a:schemeClr>
+          </a:lnRef>
+          <a:fillRef idx="1">
+            <a:schemeClr val="accent1"/>
+          </a:fillRef>
+          <a:effectRef idx="0">
+            <a:schemeClr val="accent1"/>
+          </a:effectRef>
+          <a:fontRef idx="minor">
+            <a:schemeClr val="lt1"/>
+          </a:fontRef>
+        </p:style>
+        <p:txBody>
+          <a:bodyPr rtlCol="0" anchor="ctr"/>
+          <a:lstStyle/>
+          <a:p>
+            <a:pPr algn="ctr"/>
+            <a:r>
+              <a:rPr lang="en-IE" sz="1000" dirty="0"/>
+              <a:t>Mendix App Pod</a:t>
+            </a:r>
+            <a:endParaRPr lang="en-US" sz="1000" dirty="0"/>
+          </a:p>
+        </p:txBody>
+      </p:sp>
+      <p:sp>
+        <p:nvSpPr>
+          <p:cNvPr id="25" name="Rectangle 24">
+            <a:extLst>
+              <a:ext uri="{FF2B5EF4-FFF2-40B4-BE49-F238E27FC236}">
+                <a16:creationId xmlns:a16="http://schemas.microsoft.com/office/drawing/2014/main" id="{892465C8-D68A-43CB-A039-7448B6629ABF}"/>
+              </a:ext>
+            </a:extLst>
+          </p:cNvPr>
+          <p:cNvSpPr/>
+          <p:nvPr/>
+        </p:nvSpPr>
+        <p:spPr>
+          <a:xfrm>
+            <a:off x="6711748" y="2280577"/>
+            <a:ext cx="964850" cy="649241"/>
+          </a:xfrm>
+          <a:prstGeom prst="rect">
+            <a:avLst/>
+          </a:prstGeom>
+        </p:spPr>
+        <p:style>
+          <a:lnRef idx="2">
+            <a:schemeClr val="accent1">
+              <a:shade val="50000"/>
+            </a:schemeClr>
+          </a:lnRef>
+          <a:fillRef idx="1">
+            <a:schemeClr val="accent1"/>
+          </a:fillRef>
+          <a:effectRef idx="0">
+            <a:schemeClr val="accent1"/>
+          </a:effectRef>
+          <a:fontRef idx="minor">
+            <a:schemeClr val="lt1"/>
+          </a:fontRef>
+        </p:style>
+        <p:txBody>
+          <a:bodyPr rtlCol="0" anchor="ctr"/>
+          <a:lstStyle/>
+          <a:p>
+            <a:pPr algn="ctr"/>
+            <a:r>
+              <a:rPr lang="en-IE" sz="1000" dirty="0"/>
+              <a:t>Mendix App Pod</a:t>
+            </a:r>
+            <a:endParaRPr lang="en-US" sz="1000" dirty="0"/>
+          </a:p>
+        </p:txBody>
+      </p:sp>
+      <p:cxnSp>
+        <p:nvCxnSpPr>
+          <p:cNvPr id="27" name="Straight Arrow Connector 26">
+            <a:extLst>
+              <a:ext uri="{FF2B5EF4-FFF2-40B4-BE49-F238E27FC236}">
+                <a16:creationId xmlns:a16="http://schemas.microsoft.com/office/drawing/2014/main" id="{23206046-042D-49C4-86CA-9178935B1DE8}"/>
+              </a:ext>
+            </a:extLst>
+          </p:cNvPr>
+          <p:cNvCxnSpPr>
+            <a:cxnSpLocks/>
+            <a:stCxn id="6" idx="3"/>
+            <a:endCxn id="25" idx="1"/>
+          </p:cNvCxnSpPr>
+          <p:nvPr/>
+        </p:nvCxnSpPr>
+        <p:spPr>
+          <a:xfrm flipV="1">
+            <a:off x="6062445" y="2605198"/>
+            <a:ext cx="649303" cy="1154350"/>
+          </a:xfrm>
+          <a:prstGeom prst="straightConnector1">
+            <a:avLst/>
+          </a:prstGeom>
+          <a:ln>
+            <a:headEnd type="none"/>
+            <a:tailEnd type="triangle"/>
+          </a:ln>
+        </p:spPr>
+        <p:style>
+          <a:lnRef idx="3">
+            <a:schemeClr val="accent1"/>
+          </a:lnRef>
+          <a:fillRef idx="0">
+            <a:schemeClr val="accent1"/>
+          </a:fillRef>
+          <a:effectRef idx="2">
+            <a:schemeClr val="accent1"/>
+          </a:effectRef>
+          <a:fontRef idx="minor">
+            <a:schemeClr val="tx1"/>
+          </a:fontRef>
+        </p:style>
+      </p:cxnSp>
+      <p:cxnSp>
+        <p:nvCxnSpPr>
+          <p:cNvPr id="28" name="Straight Arrow Connector 27">
+            <a:extLst>
+              <a:ext uri="{FF2B5EF4-FFF2-40B4-BE49-F238E27FC236}">
+                <a16:creationId xmlns:a16="http://schemas.microsoft.com/office/drawing/2014/main" id="{857C2C73-131F-4CF4-9F68-8D81D3A5ECC9}"/>
+              </a:ext>
+            </a:extLst>
+          </p:cNvPr>
+          <p:cNvCxnSpPr>
+            <a:cxnSpLocks/>
+            <a:stCxn id="6" idx="3"/>
+            <a:endCxn id="24" idx="1"/>
+          </p:cNvCxnSpPr>
+          <p:nvPr/>
+        </p:nvCxnSpPr>
+        <p:spPr>
+          <a:xfrm>
+            <a:off x="6062445" y="3759548"/>
+            <a:ext cx="649303" cy="1209449"/>
+          </a:xfrm>
+          <a:prstGeom prst="straightConnector1">
+            <a:avLst/>
+          </a:prstGeom>
+          <a:ln>
+            <a:headEnd type="none"/>
+            <a:tailEnd type="triangle"/>
+          </a:ln>
+        </p:spPr>
+        <p:style>
+          <a:lnRef idx="3">
+            <a:schemeClr val="accent1"/>
+          </a:lnRef>
+          <a:fillRef idx="0">
+            <a:schemeClr val="accent1"/>
+          </a:fillRef>
+          <a:effectRef idx="2">
+            <a:schemeClr val="accent1"/>
+          </a:effectRef>
+          <a:fontRef idx="minor">
+            <a:schemeClr val="tx1"/>
+          </a:fontRef>
+        </p:style>
+      </p:cxnSp>
+      <p:pic>
+        <p:nvPicPr>
+          <p:cNvPr id="26" name="Graphic 25" descr="Browser window with solid fill">
+            <a:extLst>
+              <a:ext uri="{FF2B5EF4-FFF2-40B4-BE49-F238E27FC236}">
+                <a16:creationId xmlns:a16="http://schemas.microsoft.com/office/drawing/2014/main" id="{1B81F63E-F967-4C73-8D9E-68AAB0211633}"/>
+              </a:ext>
+            </a:extLst>
+          </p:cNvPr>
+          <p:cNvPicPr>
+            <a:picLocks noChangeAspect="1"/>
+          </p:cNvPicPr>
+          <p:nvPr/>
+        </p:nvPicPr>
+        <p:blipFill>
+          <a:blip r:embed="rId2">
+            <a:extLst>
+              <a:ext uri="{28A0092B-C50C-407E-A947-70E740481C1C}">
+                <a14:useLocalDpi xmlns:a14="http://schemas.microsoft.com/office/drawing/2010/main" val="0"/>
+              </a:ext>
+              <a:ext uri="{96DAC541-7B7A-43D3-8B79-37D633B846F1}">
+                <asvg:svgBlip xmlns:asvg="http://schemas.microsoft.com/office/drawing/2016/SVG/main" r:embed="rId3"/>
+              </a:ext>
+            </a:extLst>
+          </a:blip>
+          <a:stretch>
+            <a:fillRect/>
+          </a:stretch>
+        </p:blipFill>
+        <p:spPr>
+          <a:xfrm>
+            <a:off x="1891060" y="3235006"/>
+            <a:ext cx="1037230" cy="1037230"/>
+          </a:xfrm>
+          <a:prstGeom prst="rect">
+            <a:avLst/>
+          </a:prstGeom>
+        </p:spPr>
+      </p:pic>
+      <p:sp>
+        <p:nvSpPr>
+          <p:cNvPr id="29" name="TextBox 28">
+            <a:extLst>
+              <a:ext uri="{FF2B5EF4-FFF2-40B4-BE49-F238E27FC236}">
+                <a16:creationId xmlns:a16="http://schemas.microsoft.com/office/drawing/2014/main" id="{EE8CBA91-EDB9-4800-802D-150BED9794BD}"/>
+              </a:ext>
+            </a:extLst>
+          </p:cNvPr>
+          <p:cNvSpPr txBox="1"/>
+          <p:nvPr/>
+        </p:nvSpPr>
+        <p:spPr>
+          <a:xfrm>
+            <a:off x="1891060" y="4078240"/>
+            <a:ext cx="1037230" cy="200055"/>
+          </a:xfrm>
+          <a:prstGeom prst="rect">
+            <a:avLst/>
+          </a:prstGeom>
+          <a:noFill/>
+        </p:spPr>
+        <p:txBody>
+          <a:bodyPr wrap="square" rtlCol="0">
+            <a:spAutoFit/>
+          </a:bodyPr>
+          <a:lstStyle/>
+          <a:p>
+            <a:pPr algn="ctr"/>
+            <a:r>
+              <a:rPr lang="en-US" sz="700" dirty="0"/>
+              <a:t>Web Browser</a:t>
+            </a:r>
+          </a:p>
+        </p:txBody>
+      </p:sp>
+      <p:pic>
+        <p:nvPicPr>
+          <p:cNvPr id="30" name="Graphic 29" descr="Browser window with solid fill">
+            <a:extLst>
+              <a:ext uri="{FF2B5EF4-FFF2-40B4-BE49-F238E27FC236}">
+                <a16:creationId xmlns:a16="http://schemas.microsoft.com/office/drawing/2014/main" id="{39880727-C193-4E13-95B1-7E24D3F8B7BB}"/>
+              </a:ext>
+            </a:extLst>
+          </p:cNvPr>
+          <p:cNvPicPr>
+            <a:picLocks noChangeAspect="1"/>
+          </p:cNvPicPr>
+          <p:nvPr/>
+        </p:nvPicPr>
+        <p:blipFill>
+          <a:blip r:embed="rId2">
+            <a:extLst>
+              <a:ext uri="{28A0092B-C50C-407E-A947-70E740481C1C}">
+                <a14:useLocalDpi xmlns:a14="http://schemas.microsoft.com/office/drawing/2010/main" val="0"/>
+              </a:ext>
+              <a:ext uri="{96DAC541-7B7A-43D3-8B79-37D633B846F1}">
+                <asvg:svgBlip xmlns:asvg="http://schemas.microsoft.com/office/drawing/2016/SVG/main" r:embed="rId3"/>
+              </a:ext>
+            </a:extLst>
+          </a:blip>
+          <a:stretch>
+            <a:fillRect/>
+          </a:stretch>
+        </p:blipFill>
+        <p:spPr>
+          <a:xfrm>
+            <a:off x="1891060" y="4444455"/>
+            <a:ext cx="1037230" cy="1037230"/>
+          </a:xfrm>
+          <a:prstGeom prst="rect">
+            <a:avLst/>
+          </a:prstGeom>
+        </p:spPr>
+      </p:pic>
+      <p:pic>
+        <p:nvPicPr>
+          <p:cNvPr id="31" name="Graphic 30" descr="Browser window with solid fill">
+            <a:extLst>
+              <a:ext uri="{FF2B5EF4-FFF2-40B4-BE49-F238E27FC236}">
+                <a16:creationId xmlns:a16="http://schemas.microsoft.com/office/drawing/2014/main" id="{73EE03F3-21A2-4E06-A46E-6A20B462C4CC}"/>
+              </a:ext>
+            </a:extLst>
+          </p:cNvPr>
+          <p:cNvPicPr>
+            <a:picLocks noChangeAspect="1"/>
+          </p:cNvPicPr>
+          <p:nvPr/>
+        </p:nvPicPr>
+        <p:blipFill>
+          <a:blip r:embed="rId2">
+            <a:extLst>
+              <a:ext uri="{28A0092B-C50C-407E-A947-70E740481C1C}">
+                <a14:useLocalDpi xmlns:a14="http://schemas.microsoft.com/office/drawing/2010/main" val="0"/>
+              </a:ext>
+              <a:ext uri="{96DAC541-7B7A-43D3-8B79-37D633B846F1}">
+                <asvg:svgBlip xmlns:asvg="http://schemas.microsoft.com/office/drawing/2016/SVG/main" r:embed="rId3"/>
+              </a:ext>
+            </a:extLst>
+          </a:blip>
+          <a:stretch>
+            <a:fillRect/>
+          </a:stretch>
+        </p:blipFill>
+        <p:spPr>
+          <a:xfrm>
+            <a:off x="1891060" y="2086583"/>
+            <a:ext cx="1037230" cy="1037230"/>
+          </a:xfrm>
+          <a:prstGeom prst="rect">
+            <a:avLst/>
+          </a:prstGeom>
+        </p:spPr>
+      </p:pic>
+      <p:sp>
+        <p:nvSpPr>
+          <p:cNvPr id="32" name="TextBox 31">
+            <a:extLst>
+              <a:ext uri="{FF2B5EF4-FFF2-40B4-BE49-F238E27FC236}">
+                <a16:creationId xmlns:a16="http://schemas.microsoft.com/office/drawing/2014/main" id="{8CB4EF64-EA2D-41F4-BDF2-C970A6C01EB0}"/>
+              </a:ext>
+            </a:extLst>
+          </p:cNvPr>
+          <p:cNvSpPr txBox="1"/>
+          <p:nvPr/>
+        </p:nvSpPr>
+        <p:spPr>
+          <a:xfrm>
+            <a:off x="1891060" y="2926787"/>
+            <a:ext cx="1037230" cy="200055"/>
+          </a:xfrm>
+          <a:prstGeom prst="rect">
+            <a:avLst/>
+          </a:prstGeom>
+          <a:noFill/>
+        </p:spPr>
+        <p:txBody>
+          <a:bodyPr wrap="square" rtlCol="0">
+            <a:spAutoFit/>
+          </a:bodyPr>
+          <a:lstStyle/>
+          <a:p>
+            <a:pPr algn="ctr"/>
+            <a:r>
+              <a:rPr lang="en-US" sz="700" dirty="0"/>
+              <a:t>Web Browser</a:t>
+            </a:r>
+          </a:p>
+        </p:txBody>
+      </p:sp>
+      <p:sp>
+        <p:nvSpPr>
+          <p:cNvPr id="33" name="TextBox 32">
+            <a:extLst>
+              <a:ext uri="{FF2B5EF4-FFF2-40B4-BE49-F238E27FC236}">
+                <a16:creationId xmlns:a16="http://schemas.microsoft.com/office/drawing/2014/main" id="{8776955E-3E0E-41A8-B5FE-F91112B79136}"/>
+              </a:ext>
+            </a:extLst>
+          </p:cNvPr>
+          <p:cNvSpPr txBox="1"/>
+          <p:nvPr/>
+        </p:nvSpPr>
+        <p:spPr>
+          <a:xfrm>
+            <a:off x="1891060" y="5281630"/>
+            <a:ext cx="1037230" cy="200055"/>
+          </a:xfrm>
+          <a:prstGeom prst="rect">
+            <a:avLst/>
+          </a:prstGeom>
+          <a:noFill/>
+        </p:spPr>
+        <p:txBody>
+          <a:bodyPr wrap="square" rtlCol="0">
+            <a:spAutoFit/>
+          </a:bodyPr>
+          <a:lstStyle/>
+          <a:p>
+            <a:pPr algn="ctr"/>
+            <a:r>
+              <a:rPr lang="en-US" sz="700" dirty="0"/>
+              <a:t>Web Browser</a:t>
+            </a:r>
+          </a:p>
+        </p:txBody>
+      </p:sp>
     </p:spTree>
     <p:extLst>
       <p:ext uri="{BB962C8B-B14F-4D97-AF65-F5344CB8AC3E}">
-        <p14:creationId xmlns:p14="http://schemas.microsoft.com/office/powerpoint/2010/main" val="3587132095"/>
+        <p14:creationId xmlns:p14="http://schemas.microsoft.com/office/powerpoint/2010/main" val="1770140419"/>
       </p:ext>
     </p:extLst>
   </p:cSld>

</xml_diff>